<commit_message>
update cards, tokens, spies
</commit_message>
<xml_diff>
--- a/spies_design.pptx
+++ b/spies_design.pptx
@@ -4,6 +4,9 @@
   <p:sldMasterIdLst>
     <p:sldMasterId id="2147483648" r:id="rId1"/>
   </p:sldMasterIdLst>
+  <p:notesMasterIdLst>
+    <p:notesMasterId r:id="rId5"/>
+  </p:notesMasterIdLst>
   <p:sldIdLst>
     <p:sldId id="262" r:id="rId2"/>
     <p:sldId id="260" r:id="rId3"/>
@@ -114,6 +117,440 @@
 </p:presentation>
 </file>
 
+<file path=ppt/notesMasters/notesMaster1.xml><?xml version="1.0" encoding="utf-8"?>
+<p:notesMaster xmlns:a="http://schemas.openxmlformats.org/drawingml/2006/main" xmlns:r="http://schemas.openxmlformats.org/officeDocument/2006/relationships" xmlns:p="http://schemas.openxmlformats.org/presentationml/2006/main">
+  <p:cSld>
+    <p:bg>
+      <p:bgRef idx="1001">
+        <a:schemeClr val="bg1"/>
+      </p:bgRef>
+    </p:bg>
+    <p:spTree>
+      <p:nvGrpSpPr>
+        <p:cNvPr id="1" name=""/>
+        <p:cNvGrpSpPr/>
+        <p:nvPr/>
+      </p:nvGrpSpPr>
+      <p:grpSpPr>
+        <a:xfrm>
+          <a:off x="0" y="0"/>
+          <a:ext cx="0" cy="0"/>
+          <a:chOff x="0" y="0"/>
+          <a:chExt cx="0" cy="0"/>
+        </a:xfrm>
+      </p:grpSpPr>
+      <p:sp>
+        <p:nvSpPr>
+          <p:cNvPr id="2" name="Espace réservé de l'en-tête 1"/>
+          <p:cNvSpPr>
+            <a:spLocks noGrp="1"/>
+          </p:cNvSpPr>
+          <p:nvPr>
+            <p:ph type="hdr" sz="quarter"/>
+          </p:nvPr>
+        </p:nvSpPr>
+        <p:spPr>
+          <a:xfrm>
+            <a:off x="0" y="0"/>
+            <a:ext cx="2971800" cy="458788"/>
+          </a:xfrm>
+          <a:prstGeom prst="rect">
+            <a:avLst/>
+          </a:prstGeom>
+        </p:spPr>
+        <p:txBody>
+          <a:bodyPr vert="horz" lIns="91440" tIns="45720" rIns="91440" bIns="45720" rtlCol="0"/>
+          <a:lstStyle>
+            <a:lvl1pPr algn="l">
+              <a:defRPr sz="1200"/>
+            </a:lvl1pPr>
+          </a:lstStyle>
+          <a:p>
+            <a:endParaRPr lang="fr-FR"/>
+          </a:p>
+        </p:txBody>
+      </p:sp>
+      <p:sp>
+        <p:nvSpPr>
+          <p:cNvPr id="3" name="Espace réservé de la date 2"/>
+          <p:cNvSpPr>
+            <a:spLocks noGrp="1"/>
+          </p:cNvSpPr>
+          <p:nvPr>
+            <p:ph type="dt" idx="1"/>
+          </p:nvPr>
+        </p:nvSpPr>
+        <p:spPr>
+          <a:xfrm>
+            <a:off x="3884613" y="0"/>
+            <a:ext cx="2971800" cy="458788"/>
+          </a:xfrm>
+          <a:prstGeom prst="rect">
+            <a:avLst/>
+          </a:prstGeom>
+        </p:spPr>
+        <p:txBody>
+          <a:bodyPr vert="horz" lIns="91440" tIns="45720" rIns="91440" bIns="45720" rtlCol="0"/>
+          <a:lstStyle>
+            <a:lvl1pPr algn="r">
+              <a:defRPr sz="1200"/>
+            </a:lvl1pPr>
+          </a:lstStyle>
+          <a:p>
+            <a:fld id="{718E8A5C-0E5F-4186-9EE1-7053F02A3AFB}" type="datetimeFigureOut">
+              <a:rPr lang="fr-FR" smtClean="0"/>
+              <a:t>21/09/2018</a:t>
+            </a:fld>
+            <a:endParaRPr lang="fr-FR"/>
+          </a:p>
+        </p:txBody>
+      </p:sp>
+      <p:sp>
+        <p:nvSpPr>
+          <p:cNvPr id="4" name="Espace réservé de l'image des diapositives 3"/>
+          <p:cNvSpPr>
+            <a:spLocks noGrp="1" noRot="1" noChangeAspect="1"/>
+          </p:cNvSpPr>
+          <p:nvPr>
+            <p:ph type="sldImg" idx="2"/>
+          </p:nvPr>
+        </p:nvSpPr>
+        <p:spPr>
+          <a:xfrm>
+            <a:off x="685800" y="1143000"/>
+            <a:ext cx="5486400" cy="3086100"/>
+          </a:xfrm>
+          <a:prstGeom prst="rect">
+            <a:avLst/>
+          </a:prstGeom>
+          <a:noFill/>
+          <a:ln w="12700">
+            <a:solidFill>
+              <a:prstClr val="black"/>
+            </a:solidFill>
+          </a:ln>
+        </p:spPr>
+        <p:txBody>
+          <a:bodyPr vert="horz" lIns="91440" tIns="45720" rIns="91440" bIns="45720" rtlCol="0" anchor="ctr"/>
+          <a:lstStyle/>
+          <a:p>
+            <a:endParaRPr lang="fr-FR"/>
+          </a:p>
+        </p:txBody>
+      </p:sp>
+      <p:sp>
+        <p:nvSpPr>
+          <p:cNvPr id="5" name="Espace réservé des commentaires 4"/>
+          <p:cNvSpPr>
+            <a:spLocks noGrp="1"/>
+          </p:cNvSpPr>
+          <p:nvPr>
+            <p:ph type="body" sz="quarter" idx="3"/>
+          </p:nvPr>
+        </p:nvSpPr>
+        <p:spPr>
+          <a:xfrm>
+            <a:off x="685800" y="4400550"/>
+            <a:ext cx="5486400" cy="3600450"/>
+          </a:xfrm>
+          <a:prstGeom prst="rect">
+            <a:avLst/>
+          </a:prstGeom>
+        </p:spPr>
+        <p:txBody>
+          <a:bodyPr vert="horz" lIns="91440" tIns="45720" rIns="91440" bIns="45720" rtlCol="0"/>
+          <a:lstStyle/>
+          <a:p>
+            <a:pPr lvl="0"/>
+            <a:r>
+              <a:rPr lang="fr-FR" smtClean="0"/>
+              <a:t>Modifiez les styles du texte du masque</a:t>
+            </a:r>
+          </a:p>
+          <a:p>
+            <a:pPr lvl="1"/>
+            <a:r>
+              <a:rPr lang="fr-FR" smtClean="0"/>
+              <a:t>Deuxième niveau</a:t>
+            </a:r>
+          </a:p>
+          <a:p>
+            <a:pPr lvl="2"/>
+            <a:r>
+              <a:rPr lang="fr-FR" smtClean="0"/>
+              <a:t>Troisième niveau</a:t>
+            </a:r>
+          </a:p>
+          <a:p>
+            <a:pPr lvl="3"/>
+            <a:r>
+              <a:rPr lang="fr-FR" smtClean="0"/>
+              <a:t>Quatrième niveau</a:t>
+            </a:r>
+          </a:p>
+          <a:p>
+            <a:pPr lvl="4"/>
+            <a:r>
+              <a:rPr lang="fr-FR" smtClean="0"/>
+              <a:t>Cinquième niveau</a:t>
+            </a:r>
+            <a:endParaRPr lang="fr-FR"/>
+          </a:p>
+        </p:txBody>
+      </p:sp>
+      <p:sp>
+        <p:nvSpPr>
+          <p:cNvPr id="6" name="Espace réservé du pied de page 5"/>
+          <p:cNvSpPr>
+            <a:spLocks noGrp="1"/>
+          </p:cNvSpPr>
+          <p:nvPr>
+            <p:ph type="ftr" sz="quarter" idx="4"/>
+          </p:nvPr>
+        </p:nvSpPr>
+        <p:spPr>
+          <a:xfrm>
+            <a:off x="0" y="8685213"/>
+            <a:ext cx="2971800" cy="458787"/>
+          </a:xfrm>
+          <a:prstGeom prst="rect">
+            <a:avLst/>
+          </a:prstGeom>
+        </p:spPr>
+        <p:txBody>
+          <a:bodyPr vert="horz" lIns="91440" tIns="45720" rIns="91440" bIns="45720" rtlCol="0" anchor="b"/>
+          <a:lstStyle>
+            <a:lvl1pPr algn="l">
+              <a:defRPr sz="1200"/>
+            </a:lvl1pPr>
+          </a:lstStyle>
+          <a:p>
+            <a:endParaRPr lang="fr-FR"/>
+          </a:p>
+        </p:txBody>
+      </p:sp>
+      <p:sp>
+        <p:nvSpPr>
+          <p:cNvPr id="7" name="Espace réservé du numéro de diapositive 6"/>
+          <p:cNvSpPr>
+            <a:spLocks noGrp="1"/>
+          </p:cNvSpPr>
+          <p:nvPr>
+            <p:ph type="sldNum" sz="quarter" idx="5"/>
+          </p:nvPr>
+        </p:nvSpPr>
+        <p:spPr>
+          <a:xfrm>
+            <a:off x="3884613" y="8685213"/>
+            <a:ext cx="2971800" cy="458787"/>
+          </a:xfrm>
+          <a:prstGeom prst="rect">
+            <a:avLst/>
+          </a:prstGeom>
+        </p:spPr>
+        <p:txBody>
+          <a:bodyPr vert="horz" lIns="91440" tIns="45720" rIns="91440" bIns="45720" rtlCol="0" anchor="b"/>
+          <a:lstStyle>
+            <a:lvl1pPr algn="r">
+              <a:defRPr sz="1200"/>
+            </a:lvl1pPr>
+          </a:lstStyle>
+          <a:p>
+            <a:fld id="{1E629CB7-D0EA-4B07-923C-BE1FD84D221D}" type="slidenum">
+              <a:rPr lang="fr-FR" smtClean="0"/>
+              <a:t>‹N°›</a:t>
+            </a:fld>
+            <a:endParaRPr lang="fr-FR"/>
+          </a:p>
+        </p:txBody>
+      </p:sp>
+    </p:spTree>
+    <p:extLst>
+      <p:ext uri="{BB962C8B-B14F-4D97-AF65-F5344CB8AC3E}">
+        <p14:creationId xmlns:p14="http://schemas.microsoft.com/office/powerpoint/2010/main" val="2063233942"/>
+      </p:ext>
+    </p:extLst>
+  </p:cSld>
+  <p:clrMap bg1="lt1" tx1="dk1" bg2="lt2" tx2="dk2" accent1="accent1" accent2="accent2" accent3="accent3" accent4="accent4" accent5="accent5" accent6="accent6" hlink="hlink" folHlink="folHlink"/>
+  <p:notesStyle>
+    <a:lvl1pPr marL="0" algn="l" defTabSz="914400" rtl="0" eaLnBrk="1" latinLnBrk="0" hangingPunct="1">
+      <a:defRPr sz="1200" kern="1200">
+        <a:solidFill>
+          <a:schemeClr val="tx1"/>
+        </a:solidFill>
+        <a:latin typeface="+mn-lt"/>
+        <a:ea typeface="+mn-ea"/>
+        <a:cs typeface="+mn-cs"/>
+      </a:defRPr>
+    </a:lvl1pPr>
+    <a:lvl2pPr marL="457200" algn="l" defTabSz="914400" rtl="0" eaLnBrk="1" latinLnBrk="0" hangingPunct="1">
+      <a:defRPr sz="1200" kern="1200">
+        <a:solidFill>
+          <a:schemeClr val="tx1"/>
+        </a:solidFill>
+        <a:latin typeface="+mn-lt"/>
+        <a:ea typeface="+mn-ea"/>
+        <a:cs typeface="+mn-cs"/>
+      </a:defRPr>
+    </a:lvl2pPr>
+    <a:lvl3pPr marL="914400" algn="l" defTabSz="914400" rtl="0" eaLnBrk="1" latinLnBrk="0" hangingPunct="1">
+      <a:defRPr sz="1200" kern="1200">
+        <a:solidFill>
+          <a:schemeClr val="tx1"/>
+        </a:solidFill>
+        <a:latin typeface="+mn-lt"/>
+        <a:ea typeface="+mn-ea"/>
+        <a:cs typeface="+mn-cs"/>
+      </a:defRPr>
+    </a:lvl3pPr>
+    <a:lvl4pPr marL="1371600" algn="l" defTabSz="914400" rtl="0" eaLnBrk="1" latinLnBrk="0" hangingPunct="1">
+      <a:defRPr sz="1200" kern="1200">
+        <a:solidFill>
+          <a:schemeClr val="tx1"/>
+        </a:solidFill>
+        <a:latin typeface="+mn-lt"/>
+        <a:ea typeface="+mn-ea"/>
+        <a:cs typeface="+mn-cs"/>
+      </a:defRPr>
+    </a:lvl4pPr>
+    <a:lvl5pPr marL="1828800" algn="l" defTabSz="914400" rtl="0" eaLnBrk="1" latinLnBrk="0" hangingPunct="1">
+      <a:defRPr sz="1200" kern="1200">
+        <a:solidFill>
+          <a:schemeClr val="tx1"/>
+        </a:solidFill>
+        <a:latin typeface="+mn-lt"/>
+        <a:ea typeface="+mn-ea"/>
+        <a:cs typeface="+mn-cs"/>
+      </a:defRPr>
+    </a:lvl5pPr>
+    <a:lvl6pPr marL="2286000" algn="l" defTabSz="914400" rtl="0" eaLnBrk="1" latinLnBrk="0" hangingPunct="1">
+      <a:defRPr sz="1200" kern="1200">
+        <a:solidFill>
+          <a:schemeClr val="tx1"/>
+        </a:solidFill>
+        <a:latin typeface="+mn-lt"/>
+        <a:ea typeface="+mn-ea"/>
+        <a:cs typeface="+mn-cs"/>
+      </a:defRPr>
+    </a:lvl6pPr>
+    <a:lvl7pPr marL="2743200" algn="l" defTabSz="914400" rtl="0" eaLnBrk="1" latinLnBrk="0" hangingPunct="1">
+      <a:defRPr sz="1200" kern="1200">
+        <a:solidFill>
+          <a:schemeClr val="tx1"/>
+        </a:solidFill>
+        <a:latin typeface="+mn-lt"/>
+        <a:ea typeface="+mn-ea"/>
+        <a:cs typeface="+mn-cs"/>
+      </a:defRPr>
+    </a:lvl7pPr>
+    <a:lvl8pPr marL="3200400" algn="l" defTabSz="914400" rtl="0" eaLnBrk="1" latinLnBrk="0" hangingPunct="1">
+      <a:defRPr sz="1200" kern="1200">
+        <a:solidFill>
+          <a:schemeClr val="tx1"/>
+        </a:solidFill>
+        <a:latin typeface="+mn-lt"/>
+        <a:ea typeface="+mn-ea"/>
+        <a:cs typeface="+mn-cs"/>
+      </a:defRPr>
+    </a:lvl8pPr>
+    <a:lvl9pPr marL="3657600" algn="l" defTabSz="914400" rtl="0" eaLnBrk="1" latinLnBrk="0" hangingPunct="1">
+      <a:defRPr sz="1200" kern="1200">
+        <a:solidFill>
+          <a:schemeClr val="tx1"/>
+        </a:solidFill>
+        <a:latin typeface="+mn-lt"/>
+        <a:ea typeface="+mn-ea"/>
+        <a:cs typeface="+mn-cs"/>
+      </a:defRPr>
+    </a:lvl9pPr>
+  </p:notesStyle>
+</p:notesMaster>
+</file>
+
+<file path=ppt/notesSlides/notesSlide1.xml><?xml version="1.0" encoding="utf-8"?>
+<p:notes xmlns:a="http://schemas.openxmlformats.org/drawingml/2006/main" xmlns:r="http://schemas.openxmlformats.org/officeDocument/2006/relationships" xmlns:p="http://schemas.openxmlformats.org/presentationml/2006/main">
+  <p:cSld>
+    <p:spTree>
+      <p:nvGrpSpPr>
+        <p:cNvPr id="1" name=""/>
+        <p:cNvGrpSpPr/>
+        <p:nvPr/>
+      </p:nvGrpSpPr>
+      <p:grpSpPr>
+        <a:xfrm>
+          <a:off x="0" y="0"/>
+          <a:ext cx="0" cy="0"/>
+          <a:chOff x="0" y="0"/>
+          <a:chExt cx="0" cy="0"/>
+        </a:xfrm>
+      </p:grpSpPr>
+      <p:sp>
+        <p:nvSpPr>
+          <p:cNvPr id="2" name="Espace réservé de l'image des diapositives 1"/>
+          <p:cNvSpPr>
+            <a:spLocks noGrp="1" noRot="1" noChangeAspect="1"/>
+          </p:cNvSpPr>
+          <p:nvPr>
+            <p:ph type="sldImg"/>
+          </p:nvPr>
+        </p:nvSpPr>
+        <p:spPr/>
+      </p:sp>
+      <p:sp>
+        <p:nvSpPr>
+          <p:cNvPr id="3" name="Espace réservé des commentaires 2"/>
+          <p:cNvSpPr>
+            <a:spLocks noGrp="1"/>
+          </p:cNvSpPr>
+          <p:nvPr>
+            <p:ph type="body" idx="1"/>
+          </p:nvPr>
+        </p:nvSpPr>
+        <p:spPr/>
+        <p:txBody>
+          <a:bodyPr/>
+          <a:lstStyle/>
+          <a:p>
+            <a:endParaRPr lang="fr-FR" dirty="0"/>
+          </a:p>
+        </p:txBody>
+      </p:sp>
+      <p:sp>
+        <p:nvSpPr>
+          <p:cNvPr id="4" name="Espace réservé du numéro de diapositive 3"/>
+          <p:cNvSpPr>
+            <a:spLocks noGrp="1"/>
+          </p:cNvSpPr>
+          <p:nvPr>
+            <p:ph type="sldNum" sz="quarter" idx="10"/>
+          </p:nvPr>
+        </p:nvSpPr>
+        <p:spPr/>
+        <p:txBody>
+          <a:bodyPr/>
+          <a:lstStyle/>
+          <a:p>
+            <a:fld id="{1E629CB7-D0EA-4B07-923C-BE1FD84D221D}" type="slidenum">
+              <a:rPr lang="fr-FR" smtClean="0"/>
+              <a:t>2</a:t>
+            </a:fld>
+            <a:endParaRPr lang="fr-FR"/>
+          </a:p>
+        </p:txBody>
+      </p:sp>
+    </p:spTree>
+    <p:extLst>
+      <p:ext uri="{BB962C8B-B14F-4D97-AF65-F5344CB8AC3E}">
+        <p14:creationId xmlns:p14="http://schemas.microsoft.com/office/powerpoint/2010/main" val="2016000109"/>
+      </p:ext>
+    </p:extLst>
+  </p:cSld>
+  <p:clrMapOvr>
+    <a:masterClrMapping/>
+  </p:clrMapOvr>
+</p:notes>
+</file>
+
 <file path=ppt/slideLayouts/slideLayout1.xml><?xml version="1.0" encoding="utf-8"?>
 <p:sldLayout xmlns:a="http://schemas.openxmlformats.org/drawingml/2006/main" xmlns:r="http://schemas.openxmlformats.org/officeDocument/2006/relationships" xmlns:p="http://schemas.openxmlformats.org/presentationml/2006/main" type="title" preserve="1">
   <p:cSld name="Diapositive de titre">
@@ -245,7 +682,7 @@
           <a:p>
             <a:fld id="{54FE57E5-782D-4BB9-8D49-38D30B1378B5}" type="datetimeFigureOut">
               <a:rPr lang="fr-FR" smtClean="0"/>
-              <a:t>10/08/2018</a:t>
+              <a:t>21/09/2018</a:t>
             </a:fld>
             <a:endParaRPr lang="fr-FR"/>
           </a:p>
@@ -415,7 +852,7 @@
           <a:p>
             <a:fld id="{54FE57E5-782D-4BB9-8D49-38D30B1378B5}" type="datetimeFigureOut">
               <a:rPr lang="fr-FR" smtClean="0"/>
-              <a:t>10/08/2018</a:t>
+              <a:t>21/09/2018</a:t>
             </a:fld>
             <a:endParaRPr lang="fr-FR"/>
           </a:p>
@@ -595,7 +1032,7 @@
           <a:p>
             <a:fld id="{54FE57E5-782D-4BB9-8D49-38D30B1378B5}" type="datetimeFigureOut">
               <a:rPr lang="fr-FR" smtClean="0"/>
-              <a:t>10/08/2018</a:t>
+              <a:t>21/09/2018</a:t>
             </a:fld>
             <a:endParaRPr lang="fr-FR"/>
           </a:p>
@@ -765,7 +1202,7 @@
           <a:p>
             <a:fld id="{54FE57E5-782D-4BB9-8D49-38D30B1378B5}" type="datetimeFigureOut">
               <a:rPr lang="fr-FR" smtClean="0"/>
-              <a:t>10/08/2018</a:t>
+              <a:t>21/09/2018</a:t>
             </a:fld>
             <a:endParaRPr lang="fr-FR"/>
           </a:p>
@@ -1011,7 +1448,7 @@
           <a:p>
             <a:fld id="{54FE57E5-782D-4BB9-8D49-38D30B1378B5}" type="datetimeFigureOut">
               <a:rPr lang="fr-FR" smtClean="0"/>
-              <a:t>10/08/2018</a:t>
+              <a:t>21/09/2018</a:t>
             </a:fld>
             <a:endParaRPr lang="fr-FR"/>
           </a:p>
@@ -1243,7 +1680,7 @@
           <a:p>
             <a:fld id="{54FE57E5-782D-4BB9-8D49-38D30B1378B5}" type="datetimeFigureOut">
               <a:rPr lang="fr-FR" smtClean="0"/>
-              <a:t>10/08/2018</a:t>
+              <a:t>21/09/2018</a:t>
             </a:fld>
             <a:endParaRPr lang="fr-FR"/>
           </a:p>
@@ -1610,7 +2047,7 @@
           <a:p>
             <a:fld id="{54FE57E5-782D-4BB9-8D49-38D30B1378B5}" type="datetimeFigureOut">
               <a:rPr lang="fr-FR" smtClean="0"/>
-              <a:t>10/08/2018</a:t>
+              <a:t>21/09/2018</a:t>
             </a:fld>
             <a:endParaRPr lang="fr-FR"/>
           </a:p>
@@ -1728,7 +2165,7 @@
           <a:p>
             <a:fld id="{54FE57E5-782D-4BB9-8D49-38D30B1378B5}" type="datetimeFigureOut">
               <a:rPr lang="fr-FR" smtClean="0"/>
-              <a:t>10/08/2018</a:t>
+              <a:t>21/09/2018</a:t>
             </a:fld>
             <a:endParaRPr lang="fr-FR"/>
           </a:p>
@@ -1823,7 +2260,7 @@
           <a:p>
             <a:fld id="{54FE57E5-782D-4BB9-8D49-38D30B1378B5}" type="datetimeFigureOut">
               <a:rPr lang="fr-FR" smtClean="0"/>
-              <a:t>10/08/2018</a:t>
+              <a:t>21/09/2018</a:t>
             </a:fld>
             <a:endParaRPr lang="fr-FR"/>
           </a:p>
@@ -2100,7 +2537,7 @@
           <a:p>
             <a:fld id="{54FE57E5-782D-4BB9-8D49-38D30B1378B5}" type="datetimeFigureOut">
               <a:rPr lang="fr-FR" smtClean="0"/>
-              <a:t>10/08/2018</a:t>
+              <a:t>21/09/2018</a:t>
             </a:fld>
             <a:endParaRPr lang="fr-FR"/>
           </a:p>
@@ -2353,7 +2790,7 @@
           <a:p>
             <a:fld id="{54FE57E5-782D-4BB9-8D49-38D30B1378B5}" type="datetimeFigureOut">
               <a:rPr lang="fr-FR" smtClean="0"/>
-              <a:t>10/08/2018</a:t>
+              <a:t>21/09/2018</a:t>
             </a:fld>
             <a:endParaRPr lang="fr-FR"/>
           </a:p>
@@ -2566,7 +3003,7 @@
           <a:p>
             <a:fld id="{54FE57E5-782D-4BB9-8D49-38D30B1378B5}" type="datetimeFigureOut">
               <a:rPr lang="fr-FR" smtClean="0"/>
-              <a:t>10/08/2018</a:t>
+              <a:t>21/09/2018</a:t>
             </a:fld>
             <a:endParaRPr lang="fr-FR"/>
           </a:p>
@@ -2993,7 +3430,11 @@
           <a:p>
             <a:r>
               <a:rPr lang="fr-FR" dirty="0" smtClean="0"/>
-              <a:t>Agents x12</a:t>
+              <a:t>espions </a:t>
+            </a:r>
+            <a:r>
+              <a:rPr lang="fr-FR" dirty="0" smtClean="0"/>
+              <a:t>x12</a:t>
             </a:r>
             <a:endParaRPr lang="fr-FR" dirty="0"/>
           </a:p>
@@ -3110,7 +3551,15 @@
             </a:r>
             <a:r>
               <a:rPr lang="fr-FR" sz="1400" dirty="0" smtClean="0"/>
-              <a:t>pour chaque autre agent violet parmi les agents présents en fin de partie</a:t>
+              <a:t>pour chaque autre </a:t>
+            </a:r>
+            <a:r>
+              <a:rPr lang="fr-FR" sz="1400" dirty="0" smtClean="0"/>
+              <a:t>espion violet présent dans la zone de jeu et dans les zones de chaque joueurs </a:t>
+            </a:r>
+            <a:r>
+              <a:rPr lang="fr-FR" sz="1400" dirty="0" smtClean="0"/>
+              <a:t>en fin de partie</a:t>
             </a:r>
             <a:endParaRPr lang="fr-FR" sz="1400" dirty="0"/>
           </a:p>
@@ -3341,7 +3790,14 @@
             <a:pPr algn="ctr"/>
             <a:r>
               <a:rPr lang="fr-FR" dirty="0" smtClean="0"/>
-              <a:t>1 pour chaque jeton sur cet agent</a:t>
+              <a:t>0</a:t>
+            </a:r>
+          </a:p>
+          <a:p>
+            <a:pPr algn="ctr"/>
+            <a:r>
+              <a:rPr lang="fr-FR" dirty="0" smtClean="0"/>
+              <a:t>Doublez le nombre de points que rapporte cet espion</a:t>
             </a:r>
             <a:endParaRPr lang="fr-FR" dirty="0"/>
           </a:p>
@@ -3509,7 +3965,6 @@
               <a:rPr lang="fr-FR" dirty="0" smtClean="0"/>
               <a:t>Kevin Kemp</a:t>
             </a:r>
-            <a:endParaRPr lang="fr-FR" dirty="0" smtClean="0"/>
           </a:p>
           <a:p>
             <a:pPr algn="ctr"/>
@@ -3524,7 +3979,6 @@
               <a:rPr lang="fr-FR" dirty="0"/>
               <a:t>2</a:t>
             </a:r>
-            <a:endParaRPr lang="fr-FR" dirty="0"/>
           </a:p>
         </p:txBody>
       </p:sp>
@@ -3582,14 +4036,39 @@
             <a:pPr algn="ctr"/>
             <a:r>
               <a:rPr lang="fr-FR" dirty="0" smtClean="0"/>
-              <a:t>4 / -2</a:t>
-            </a:r>
-          </a:p>
-          <a:p>
-            <a:pPr algn="ctr"/>
+              <a:t>0 </a:t>
+            </a:r>
             <a:r>
               <a:rPr lang="fr-FR" dirty="0" smtClean="0"/>
-              <a:t>Si un autre agent vert vous est loyal</a:t>
+              <a:t>/ </a:t>
+            </a:r>
+            <a:r>
+              <a:rPr lang="fr-FR" dirty="0" smtClean="0"/>
+              <a:t>4</a:t>
+            </a:r>
+            <a:endParaRPr lang="fr-FR" dirty="0" smtClean="0"/>
+          </a:p>
+          <a:p>
+            <a:pPr algn="ctr"/>
+            <a:r>
+              <a:rPr lang="fr-FR" dirty="0" smtClean="0"/>
+              <a:t>Si </a:t>
+            </a:r>
+            <a:r>
+              <a:rPr lang="fr-FR" dirty="0" smtClean="0"/>
+              <a:t>c’est le seul espion </a:t>
+            </a:r>
+            <a:r>
+              <a:rPr lang="fr-FR" dirty="0" smtClean="0"/>
+              <a:t>vert </a:t>
+            </a:r>
+            <a:r>
+              <a:rPr lang="fr-FR" dirty="0"/>
+              <a:t>dans la zone de jeu et dans les zones de chaque </a:t>
+            </a:r>
+            <a:r>
+              <a:rPr lang="fr-FR" dirty="0" smtClean="0"/>
+              <a:t>joueurs en fin de partie</a:t>
             </a:r>
             <a:endParaRPr lang="fr-FR" dirty="0"/>
           </a:p>
@@ -3646,7 +4125,6 @@
               <a:rPr lang="fr-FR" dirty="0" smtClean="0"/>
               <a:t>US</a:t>
             </a:r>
-            <a:endParaRPr lang="fr-FR" dirty="0" smtClean="0"/>
           </a:p>
           <a:p>
             <a:pPr algn="ctr"/>
@@ -3709,7 +4187,6 @@
               <a:rPr lang="fr-FR" dirty="0" smtClean="0"/>
               <a:t>US</a:t>
             </a:r>
-            <a:endParaRPr lang="fr-FR" dirty="0" smtClean="0"/>
           </a:p>
           <a:p>
             <a:pPr algn="ctr"/>
@@ -3731,6 +4208,13 @@
   <p:clrMapOvr>
     <a:masterClrMapping/>
   </p:clrMapOvr>
+  <p:timing>
+    <p:tnLst>
+      <p:par>
+        <p:cTn id="1" dur="indefinite" restart="never" nodeType="tmRoot"/>
+      </p:par>
+    </p:tnLst>
+  </p:timing>
 </p:sld>
 </file>
 
@@ -3761,7 +4245,12 @@
             <p:ph type="title"/>
           </p:nvPr>
         </p:nvSpPr>
-        <p:spPr/>
+        <p:spPr>
+          <a:xfrm>
+            <a:off x="-24063" y="0"/>
+            <a:ext cx="10515600" cy="752225"/>
+          </a:xfrm>
+        </p:spPr>
         <p:txBody>
           <a:bodyPr/>
           <a:lstStyle/>
@@ -3782,8 +4271,8 @@
         </p:nvSpPr>
         <p:spPr>
           <a:xfrm>
-            <a:off x="264694" y="1543411"/>
-            <a:ext cx="1443790" cy="2256171"/>
+            <a:off x="264694" y="653081"/>
+            <a:ext cx="1443790" cy="2103914"/>
           </a:xfrm>
           <a:prstGeom prst="rect">
             <a:avLst/>
@@ -3810,8 +4299,9 @@
             <a:pPr algn="ctr"/>
             <a:r>
               <a:rPr lang="fr-FR" sz="1100" b="1" dirty="0" smtClean="0"/>
-              <a:t>Fin de carrière</a:t>
-            </a:r>
+              <a:t>Nid d’espions</a:t>
+            </a:r>
+            <a:endParaRPr lang="fr-FR" sz="1100" b="1" dirty="0" smtClean="0"/>
           </a:p>
           <a:p>
             <a:pPr algn="ctr"/>
@@ -3821,42 +4311,8 @@
             <a:pPr algn="ctr"/>
             <a:r>
               <a:rPr lang="fr-FR" sz="1000" dirty="0" smtClean="0"/>
-              <a:t>Regardez secrètement les </a:t>
-            </a:r>
-            <a:r>
-              <a:rPr lang="fr-FR" sz="1000" dirty="0" err="1" smtClean="0"/>
-              <a:t>tokens</a:t>
-            </a:r>
-            <a:r>
-              <a:rPr lang="fr-FR" sz="1000" dirty="0" smtClean="0"/>
-              <a:t> d’un agent.</a:t>
-            </a:r>
-          </a:p>
-          <a:p>
-            <a:pPr algn="ctr"/>
-            <a:r>
-              <a:rPr lang="fr-FR" sz="1000" dirty="0" smtClean="0"/>
-              <a:t>Vous pouvez ensuite révéler ces </a:t>
-            </a:r>
-            <a:r>
-              <a:rPr lang="fr-FR" sz="1000" dirty="0" err="1" smtClean="0"/>
-              <a:t>tokens</a:t>
-            </a:r>
-            <a:r>
-              <a:rPr lang="fr-FR" sz="1000" dirty="0" smtClean="0"/>
-              <a:t> et récupérer immédiatement l’agent s’il vous est loyal. </a:t>
-            </a:r>
-            <a:endParaRPr lang="fr-FR" sz="1000" dirty="0" smtClean="0"/>
-          </a:p>
-          <a:p>
-            <a:pPr algn="ctr"/>
-            <a:r>
-              <a:rPr lang="fr-FR" sz="1000" dirty="0"/>
-              <a:t>Gardez cette carte devant vous, elle rapporte 1 point en fin de partie.</a:t>
-            </a:r>
-          </a:p>
-          <a:p>
-            <a:pPr algn="ctr"/>
+              <a:t>Prenez le premier espion du paquet espion, ajoutez-le dans la zone de jeu. </a:t>
+            </a:r>
             <a:endParaRPr lang="fr-FR" sz="1000" dirty="0"/>
           </a:p>
         </p:txBody>
@@ -3869,8 +4325,8 @@
         </p:nvSpPr>
         <p:spPr>
           <a:xfrm>
-            <a:off x="1848852" y="1543410"/>
-            <a:ext cx="1443790" cy="2256171"/>
+            <a:off x="1848852" y="653080"/>
+            <a:ext cx="1443790" cy="2103914"/>
           </a:xfrm>
           <a:prstGeom prst="rect">
             <a:avLst/>
@@ -3908,24 +4364,21 @@
             <a:pPr algn="ctr"/>
             <a:r>
               <a:rPr lang="fr-FR" sz="1000" dirty="0" smtClean="0"/>
-              <a:t>Regardez secrètement les </a:t>
-            </a:r>
-            <a:r>
-              <a:rPr lang="fr-FR" sz="1000" dirty="0" err="1" smtClean="0"/>
-              <a:t>tokens</a:t>
+              <a:t>Regardez secrètement </a:t>
             </a:r>
             <a:r>
               <a:rPr lang="fr-FR" sz="1000" dirty="0" smtClean="0"/>
-              <a:t> de 2 agents.</a:t>
-            </a:r>
-          </a:p>
-          <a:p>
-            <a:pPr algn="ctr"/>
+              <a:t>tous les marqueurs </a:t>
+            </a:r>
             <a:r>
               <a:rPr lang="fr-FR" sz="1000" dirty="0" smtClean="0"/>
-              <a:t>Gardez cette carte devant vous, elle rapporte 1 point en fin de partie.</a:t>
-            </a:r>
-            <a:endParaRPr lang="fr-FR" sz="1000" dirty="0"/>
+              <a:t>de 2 </a:t>
+            </a:r>
+            <a:r>
+              <a:rPr lang="fr-FR" sz="1000" dirty="0" smtClean="0"/>
+              <a:t>espions.</a:t>
+            </a:r>
+            <a:endParaRPr lang="fr-FR" sz="1000" dirty="0" smtClean="0"/>
           </a:p>
         </p:txBody>
       </p:sp>
@@ -3937,8 +4390,8 @@
         </p:nvSpPr>
         <p:spPr>
           <a:xfrm>
-            <a:off x="3433010" y="1543409"/>
-            <a:ext cx="1443790" cy="2256171"/>
+            <a:off x="3433010" y="653079"/>
+            <a:ext cx="1443790" cy="2103914"/>
           </a:xfrm>
           <a:prstGeom prst="rect">
             <a:avLst/>
@@ -3976,15 +4429,23 @@
             <a:pPr algn="ctr"/>
             <a:r>
               <a:rPr lang="fr-FR" sz="1000" dirty="0" smtClean="0"/>
-              <a:t>Retirez un agent et tous ses </a:t>
-            </a:r>
-            <a:r>
-              <a:rPr lang="fr-FR" sz="1000" dirty="0" err="1" smtClean="0"/>
-              <a:t>tokens</a:t>
+              <a:t>Retirez un </a:t>
             </a:r>
             <a:r>
               <a:rPr lang="fr-FR" sz="1000" dirty="0" smtClean="0"/>
-              <a:t> du plateau de jeu.</a:t>
+              <a:t>espion </a:t>
+            </a:r>
+            <a:r>
+              <a:rPr lang="fr-FR" sz="1000" dirty="0" smtClean="0"/>
+              <a:t>et tous ses </a:t>
+            </a:r>
+            <a:r>
+              <a:rPr lang="fr-FR" sz="1000" dirty="0" smtClean="0"/>
+              <a:t>marqueurs du </a:t>
+            </a:r>
+            <a:r>
+              <a:rPr lang="fr-FR" sz="1000" dirty="0" smtClean="0"/>
+              <a:t>plateau de jeu.</a:t>
             </a:r>
             <a:endParaRPr lang="fr-FR" sz="1000" dirty="0"/>
           </a:p>
@@ -3998,8 +4459,8 @@
         </p:nvSpPr>
         <p:spPr>
           <a:xfrm>
-            <a:off x="5017168" y="1543409"/>
-            <a:ext cx="1443790" cy="2256171"/>
+            <a:off x="5017168" y="653079"/>
+            <a:ext cx="1443790" cy="2103914"/>
           </a:xfrm>
           <a:prstGeom prst="rect">
             <a:avLst/>
@@ -4040,12 +4501,20 @@
               <a:t>Echangez les </a:t>
             </a:r>
             <a:r>
-              <a:rPr lang="fr-FR" sz="1000" dirty="0" err="1" smtClean="0"/>
-              <a:t>tokens</a:t>
-            </a:r>
-            <a:r>
               <a:rPr lang="fr-FR" sz="1000" dirty="0" smtClean="0"/>
-              <a:t> de deux agents.</a:t>
+              <a:t>marqueurs de </a:t>
+            </a:r>
+            <a:r>
+              <a:rPr lang="fr-FR" sz="1000" dirty="0" smtClean="0"/>
+              <a:t>deux </a:t>
+            </a:r>
+            <a:r>
+              <a:rPr lang="fr-FR" sz="1000" dirty="0" smtClean="0"/>
+              <a:t>espions</a:t>
+            </a:r>
+            <a:r>
+              <a:rPr lang="fr-FR" sz="1000" dirty="0" smtClean="0"/>
+              <a:t>.</a:t>
             </a:r>
             <a:endParaRPr lang="fr-FR" sz="1000" dirty="0"/>
           </a:p>
@@ -4059,8 +4528,8 @@
         </p:nvSpPr>
         <p:spPr>
           <a:xfrm>
-            <a:off x="6601326" y="1543408"/>
-            <a:ext cx="1443790" cy="2256171"/>
+            <a:off x="6601326" y="653078"/>
+            <a:ext cx="1443790" cy="2103914"/>
           </a:xfrm>
           <a:prstGeom prst="rect">
             <a:avLst/>
@@ -4087,7 +4556,7 @@
             <a:pPr algn="ctr"/>
             <a:r>
               <a:rPr lang="fr-FR" sz="1100" b="1" dirty="0" smtClean="0"/>
-              <a:t>Accord diplomatique</a:t>
+              <a:t>Plan contrecarrés</a:t>
             </a:r>
             <a:endParaRPr lang="fr-FR" sz="1100" b="1" dirty="0" smtClean="0"/>
           </a:p>
@@ -4112,8 +4581,8 @@
         </p:nvSpPr>
         <p:spPr>
           <a:xfrm>
-            <a:off x="8185484" y="1543407"/>
-            <a:ext cx="1443790" cy="2256171"/>
+            <a:off x="8185484" y="653077"/>
+            <a:ext cx="1443790" cy="2103914"/>
           </a:xfrm>
           <a:prstGeom prst="rect">
             <a:avLst/>
@@ -4165,8 +4634,8 @@
         </p:nvSpPr>
         <p:spPr>
           <a:xfrm>
-            <a:off x="9769642" y="1543406"/>
-            <a:ext cx="1443790" cy="2256171"/>
+            <a:off x="9769642" y="653076"/>
+            <a:ext cx="1443790" cy="2103914"/>
           </a:xfrm>
           <a:prstGeom prst="rect">
             <a:avLst/>
@@ -4207,12 +4676,16 @@
               <a:t>Retirez tous les </a:t>
             </a:r>
             <a:r>
-              <a:rPr lang="fr-FR" sz="1000" dirty="0" err="1" smtClean="0"/>
-              <a:t>tokens</a:t>
-            </a:r>
-            <a:r>
               <a:rPr lang="fr-FR" sz="1000" dirty="0" smtClean="0"/>
-              <a:t> d’un agent.</a:t>
+              <a:t>marqueurs </a:t>
+            </a:r>
+            <a:r>
+              <a:rPr lang="fr-FR" sz="1000" dirty="0" smtClean="0"/>
+              <a:t>d’un </a:t>
+            </a:r>
+            <a:r>
+              <a:rPr lang="fr-FR" sz="1000" dirty="0" smtClean="0"/>
+              <a:t>espion.</a:t>
             </a:r>
             <a:endParaRPr lang="fr-FR" sz="1000" dirty="0"/>
           </a:p>
@@ -4226,8 +4699,8 @@
         </p:nvSpPr>
         <p:spPr>
           <a:xfrm>
-            <a:off x="264694" y="3976039"/>
-            <a:ext cx="1443790" cy="2256169"/>
+            <a:off x="264694" y="2845079"/>
+            <a:ext cx="1443790" cy="2103912"/>
           </a:xfrm>
           <a:prstGeom prst="rect">
             <a:avLst/>
@@ -4265,7 +4738,11 @@
             <a:pPr algn="ctr"/>
             <a:r>
               <a:rPr lang="fr-FR" sz="1000" dirty="0" smtClean="0"/>
-              <a:t>Attachez cette carte à un agent. Le joueur qui récupère cet agent marque 3 points. </a:t>
+              <a:t>Marqueur 3 </a:t>
+            </a:r>
+            <a:r>
+              <a:rPr lang="fr-FR" sz="1000" dirty="0" smtClean="0"/>
+              <a:t>points. </a:t>
             </a:r>
             <a:endParaRPr lang="fr-FR" sz="1000" dirty="0"/>
           </a:p>
@@ -4279,8 +4756,8 @@
         </p:nvSpPr>
         <p:spPr>
           <a:xfrm>
-            <a:off x="1848852" y="3976038"/>
-            <a:ext cx="1443790" cy="2256169"/>
+            <a:off x="1848852" y="2845078"/>
+            <a:ext cx="1443790" cy="2103912"/>
           </a:xfrm>
           <a:prstGeom prst="rect">
             <a:avLst/>
@@ -4317,15 +4794,15 @@
           <a:p>
             <a:pPr algn="ctr"/>
             <a:r>
+              <a:rPr lang="fr-FR" sz="1000" dirty="0"/>
+              <a:t>Marqueur </a:t>
+            </a:r>
+            <a:r>
               <a:rPr lang="fr-FR" sz="1000" dirty="0" smtClean="0"/>
-              <a:t>Attachez cette carte à un agent. Le joueur qui récupère cet agent perd </a:t>
-            </a:r>
-            <a:r>
-              <a:rPr lang="fr-FR" sz="1000" dirty="0" smtClean="0"/>
-              <a:t>3 </a:t>
-            </a:r>
-            <a:r>
-              <a:rPr lang="fr-FR" sz="1000" dirty="0" smtClean="0"/>
+              <a:t>-3 </a:t>
+            </a:r>
+            <a:r>
+              <a:rPr lang="fr-FR" sz="1000" dirty="0"/>
               <a:t>points. </a:t>
             </a:r>
             <a:endParaRPr lang="fr-FR" sz="1000" dirty="0"/>
@@ -4340,8 +4817,8 @@
         </p:nvSpPr>
         <p:spPr>
           <a:xfrm>
-            <a:off x="3433010" y="3976038"/>
-            <a:ext cx="1443790" cy="2256169"/>
+            <a:off x="3433010" y="2845078"/>
+            <a:ext cx="1443790" cy="2103912"/>
           </a:xfrm>
           <a:prstGeom prst="rect">
             <a:avLst/>
@@ -4367,29 +4844,20 @@
           <a:p>
             <a:pPr algn="ctr"/>
             <a:r>
-              <a:rPr lang="fr-FR" sz="1100" b="1" dirty="0" smtClean="0"/>
-              <a:t>Contact</a:t>
-            </a:r>
-          </a:p>
-          <a:p>
-            <a:pPr algn="ctr"/>
-            <a:endParaRPr lang="fr-FR" sz="1000" dirty="0"/>
-          </a:p>
-          <a:p>
-            <a:pPr algn="ctr"/>
-            <a:r>
-              <a:rPr lang="fr-FR" sz="1000" dirty="0" smtClean="0"/>
-              <a:t>Ajoutez un de vos </a:t>
-            </a:r>
-            <a:r>
-              <a:rPr lang="fr-FR" sz="1000" dirty="0" err="1" smtClean="0"/>
-              <a:t>tokens</a:t>
-            </a:r>
-            <a:r>
-              <a:rPr lang="fr-FR" sz="1000" dirty="0" smtClean="0"/>
-              <a:t> disponible à un agent. </a:t>
-            </a:r>
-            <a:endParaRPr lang="fr-FR" sz="1000" dirty="0"/>
+              <a:rPr lang="fr-FR" sz="1400" b="1" dirty="0"/>
+              <a:t>Surveillance</a:t>
+            </a:r>
+          </a:p>
+          <a:p>
+            <a:pPr algn="ctr"/>
+            <a:endParaRPr lang="fr-FR" sz="1100" dirty="0"/>
+          </a:p>
+          <a:p>
+            <a:pPr algn="ctr"/>
+            <a:r>
+              <a:rPr lang="fr-FR" sz="1100" dirty="0"/>
+              <a:t>Regardez secrètement tous les marqueurs de 2 espions.</a:t>
+            </a:r>
           </a:p>
         </p:txBody>
       </p:sp>
@@ -4401,8 +4869,8 @@
         </p:nvSpPr>
         <p:spPr>
           <a:xfrm>
-            <a:off x="5017168" y="3976037"/>
-            <a:ext cx="1443790" cy="2256169"/>
+            <a:off x="5017168" y="2845077"/>
+            <a:ext cx="1443790" cy="2103912"/>
           </a:xfrm>
           <a:prstGeom prst="rect">
             <a:avLst/>
@@ -4442,7 +4910,6 @@
               <a:rPr lang="fr-FR" sz="1100" dirty="0" smtClean="0"/>
               <a:t>Chaque joueur pioche une carte action et jouera un tour de plus.</a:t>
             </a:r>
-            <a:endParaRPr lang="fr-FR" sz="1100" dirty="0" smtClean="0"/>
           </a:p>
           <a:p>
             <a:pPr algn="ctr"/>
@@ -4452,15 +4919,7 @@
             <a:pPr algn="ctr"/>
             <a:r>
               <a:rPr lang="fr-FR" sz="1000" dirty="0" smtClean="0"/>
-              <a:t>Gardez </a:t>
-            </a:r>
-            <a:r>
-              <a:rPr lang="fr-FR" sz="1000" dirty="0"/>
-              <a:t>cette carte devant vous, elle rapporte 1 point en fin de partie</a:t>
-            </a:r>
-            <a:r>
-              <a:rPr lang="fr-FR" sz="1000" dirty="0" smtClean="0"/>
-              <a:t>.</a:t>
+              <a:t>Piochez une carte action et résolvez-là immédiatement.</a:t>
             </a:r>
             <a:endParaRPr lang="fr-FR" sz="1000" dirty="0"/>
           </a:p>
@@ -4474,8 +4933,8 @@
         </p:nvSpPr>
         <p:spPr>
           <a:xfrm>
-            <a:off x="6601326" y="3976037"/>
-            <a:ext cx="1443790" cy="2256169"/>
+            <a:off x="6601326" y="2845077"/>
+            <a:ext cx="1443790" cy="2103912"/>
           </a:xfrm>
           <a:prstGeom prst="rect">
             <a:avLst/>
@@ -4502,8 +4961,9 @@
             <a:pPr algn="ctr"/>
             <a:r>
               <a:rPr lang="fr-FR" sz="1100" b="1" dirty="0" smtClean="0"/>
-              <a:t>Contact</a:t>
-            </a:r>
+              <a:t>Décryptage</a:t>
+            </a:r>
+            <a:endParaRPr lang="fr-FR" sz="1100" b="1" dirty="0" smtClean="0"/>
           </a:p>
           <a:p>
             <a:pPr algn="ctr"/>
@@ -4513,15 +4973,7 @@
             <a:pPr algn="ctr"/>
             <a:r>
               <a:rPr lang="fr-FR" sz="1000" dirty="0" smtClean="0"/>
-              <a:t>Ajoutez un de vos </a:t>
-            </a:r>
-            <a:r>
-              <a:rPr lang="fr-FR" sz="1000" dirty="0" err="1" smtClean="0"/>
-              <a:t>tokens</a:t>
-            </a:r>
-            <a:r>
-              <a:rPr lang="fr-FR" sz="1000" dirty="0" smtClean="0"/>
-              <a:t> disponible à un agent. </a:t>
+              <a:t>Regardez secrètement la carte action du dessus du paquet. L’autre joueur vous révèle deux cartes action de sa main (s’il ne lui en reste qu’une, il la révèle). Vous pouvez lui faire défausser une de ces cartes. Dans ce cas, l’autre joueur pioche une carte. </a:t>
             </a:r>
             <a:endParaRPr lang="fr-FR" sz="1000" dirty="0"/>
           </a:p>
@@ -4535,8 +4987,8 @@
         </p:nvSpPr>
         <p:spPr>
           <a:xfrm>
-            <a:off x="8185484" y="3976037"/>
-            <a:ext cx="1443790" cy="2256169"/>
+            <a:off x="8185484" y="2845077"/>
+            <a:ext cx="1443790" cy="2103912"/>
           </a:xfrm>
           <a:prstGeom prst="rect">
             <a:avLst/>
@@ -4578,40 +5030,53 @@
             </a:r>
             <a:r>
               <a:rPr lang="fr-FR" sz="1000" dirty="0"/>
-              <a:t>un agent </a:t>
+              <a:t>un </a:t>
             </a:r>
             <a:r>
               <a:rPr lang="fr-FR" sz="1000" dirty="0" smtClean="0"/>
-              <a:t>du plateau de jeu par un nouvel agent au hasard du paquet agent, Transférez les </a:t>
-            </a:r>
-            <a:r>
-              <a:rPr lang="fr-FR" sz="1000" dirty="0" err="1" smtClean="0"/>
-              <a:t>tokens</a:t>
+              <a:t>espion </a:t>
             </a:r>
             <a:r>
               <a:rPr lang="fr-FR" sz="1000" dirty="0" smtClean="0"/>
-              <a:t> de l’agent retiré au nouvel agent. </a:t>
-            </a:r>
-            <a:r>
-              <a:rPr lang="fr-FR" sz="1000" dirty="0"/>
-              <a:t>Ajoutez un de vos </a:t>
-            </a:r>
-            <a:r>
-              <a:rPr lang="fr-FR" sz="1000" dirty="0" err="1"/>
-              <a:t>tokens</a:t>
-            </a:r>
-            <a:r>
-              <a:rPr lang="fr-FR" sz="1000" dirty="0"/>
-              <a:t> disponible à </a:t>
+              <a:t>du plateau de jeu par un nouvel </a:t>
             </a:r>
             <a:r>
               <a:rPr lang="fr-FR" sz="1000" dirty="0" smtClean="0"/>
-              <a:t>cet agent</a:t>
-            </a:r>
-            <a:r>
-              <a:rPr lang="fr-FR" sz="1000" dirty="0"/>
-              <a:t>. </a:t>
-            </a:r>
+              <a:t>espion </a:t>
+            </a:r>
+            <a:r>
+              <a:rPr lang="fr-FR" sz="1000" dirty="0" smtClean="0"/>
+              <a:t>au hasard du paquet </a:t>
+            </a:r>
+            <a:r>
+              <a:rPr lang="fr-FR" sz="1000" dirty="0" smtClean="0"/>
+              <a:t>espion, </a:t>
+            </a:r>
+            <a:r>
+              <a:rPr lang="fr-FR" sz="1000" dirty="0" smtClean="0"/>
+              <a:t>Transférez les </a:t>
+            </a:r>
+            <a:r>
+              <a:rPr lang="fr-FR" sz="1000" dirty="0" smtClean="0"/>
+              <a:t>marqueurs </a:t>
+            </a:r>
+            <a:r>
+              <a:rPr lang="fr-FR" sz="1000" dirty="0" smtClean="0"/>
+              <a:t>de </a:t>
+            </a:r>
+            <a:r>
+              <a:rPr lang="fr-FR" sz="1000" dirty="0" smtClean="0"/>
+              <a:t>l’espion </a:t>
+            </a:r>
+            <a:r>
+              <a:rPr lang="fr-FR" sz="1000" dirty="0" smtClean="0"/>
+              <a:t>retiré au nouvel </a:t>
+            </a:r>
+            <a:r>
+              <a:rPr lang="fr-FR" sz="1000" dirty="0" smtClean="0"/>
+              <a:t>espion. </a:t>
+            </a:r>
+            <a:endParaRPr lang="fr-FR" sz="1000" dirty="0"/>
           </a:p>
           <a:p>
             <a:pPr algn="ctr"/>
@@ -4627,8 +5092,8 @@
         </p:nvSpPr>
         <p:spPr>
           <a:xfrm>
-            <a:off x="9769642" y="3976038"/>
-            <a:ext cx="1443790" cy="2256171"/>
+            <a:off x="9769642" y="2845078"/>
+            <a:ext cx="1443790" cy="2103914"/>
           </a:xfrm>
           <a:prstGeom prst="rect">
             <a:avLst/>
@@ -4655,33 +5120,231 @@
             <a:pPr algn="ctr"/>
             <a:r>
               <a:rPr lang="fr-FR" sz="1100" b="1" dirty="0" smtClean="0"/>
+              <a:t>Chantage</a:t>
+            </a:r>
+            <a:endParaRPr lang="fr-FR" sz="1100" b="1" dirty="0" smtClean="0"/>
+          </a:p>
+          <a:p>
+            <a:pPr algn="ctr"/>
+            <a:endParaRPr lang="fr-FR" sz="1000" dirty="0"/>
+          </a:p>
+          <a:p>
+            <a:pPr algn="ctr"/>
+            <a:r>
+              <a:rPr lang="fr-FR" sz="1000" dirty="0" smtClean="0"/>
+              <a:t>Prenez un marqueur spécial loyauté rouge ou bleu et mettez-le face visible sur un espion.</a:t>
+            </a:r>
+            <a:endParaRPr lang="fr-FR" sz="1000" dirty="0"/>
+          </a:p>
+        </p:txBody>
+      </p:sp>
+      <p:sp>
+        <p:nvSpPr>
+          <p:cNvPr id="18" name="Rectangle 17"/>
+          <p:cNvSpPr/>
+          <p:nvPr/>
+        </p:nvSpPr>
+        <p:spPr>
+          <a:xfrm>
+            <a:off x="264694" y="5037075"/>
+            <a:ext cx="1443790" cy="2103912"/>
+          </a:xfrm>
+          <a:prstGeom prst="rect">
+            <a:avLst/>
+          </a:prstGeom>
+        </p:spPr>
+        <p:style>
+          <a:lnRef idx="2">
+            <a:schemeClr val="dk1"/>
+          </a:lnRef>
+          <a:fillRef idx="1">
+            <a:schemeClr val="lt1"/>
+          </a:fillRef>
+          <a:effectRef idx="0">
+            <a:schemeClr val="dk1"/>
+          </a:effectRef>
+          <a:fontRef idx="minor">
+            <a:schemeClr val="dk1"/>
+          </a:fontRef>
+        </p:style>
+        <p:txBody>
+          <a:bodyPr rtlCol="0" anchor="ctr"/>
+          <a:lstStyle/>
+          <a:p>
+            <a:pPr algn="ctr"/>
+            <a:r>
+              <a:rPr lang="fr-FR" sz="1400" b="1" dirty="0"/>
               <a:t>Surveillance</a:t>
             </a:r>
           </a:p>
           <a:p>
             <a:pPr algn="ctr"/>
+            <a:endParaRPr lang="fr-FR" sz="1100" dirty="0"/>
+          </a:p>
+          <a:p>
+            <a:pPr algn="ctr"/>
+            <a:r>
+              <a:rPr lang="fr-FR" sz="1100" dirty="0"/>
+              <a:t>Regardez secrètement tous les marqueurs de 2 espions.</a:t>
+            </a:r>
+          </a:p>
+        </p:txBody>
+      </p:sp>
+      <p:sp>
+        <p:nvSpPr>
+          <p:cNvPr id="19" name="Rectangle 18"/>
+          <p:cNvSpPr/>
+          <p:nvPr/>
+        </p:nvSpPr>
+        <p:spPr>
+          <a:xfrm>
+            <a:off x="1848852" y="5037074"/>
+            <a:ext cx="1443790" cy="2103912"/>
+          </a:xfrm>
+          <a:prstGeom prst="rect">
+            <a:avLst/>
+          </a:prstGeom>
+        </p:spPr>
+        <p:style>
+          <a:lnRef idx="2">
+            <a:schemeClr val="dk1"/>
+          </a:lnRef>
+          <a:fillRef idx="1">
+            <a:schemeClr val="lt1"/>
+          </a:fillRef>
+          <a:effectRef idx="0">
+            <a:schemeClr val="dk1"/>
+          </a:effectRef>
+          <a:fontRef idx="minor">
+            <a:schemeClr val="dk1"/>
+          </a:fontRef>
+        </p:style>
+        <p:txBody>
+          <a:bodyPr rtlCol="0" anchor="ctr"/>
+          <a:lstStyle/>
+          <a:p>
+            <a:pPr algn="ctr"/>
+            <a:r>
+              <a:rPr lang="fr-FR" sz="1400" b="1" dirty="0"/>
+              <a:t>Opportunité</a:t>
+            </a:r>
+          </a:p>
+          <a:p>
+            <a:pPr algn="ctr"/>
+            <a:endParaRPr lang="fr-FR" sz="1100" dirty="0"/>
+          </a:p>
+          <a:p>
+            <a:pPr algn="ctr"/>
+            <a:r>
+              <a:rPr lang="fr-FR" sz="1100" dirty="0"/>
+              <a:t>Piochez deux cartes actions, résolvez-en une immédiatement.</a:t>
+            </a:r>
+            <a:endParaRPr lang="fr-FR" sz="1100" dirty="0"/>
+          </a:p>
+        </p:txBody>
+      </p:sp>
+      <p:sp>
+        <p:nvSpPr>
+          <p:cNvPr id="20" name="Rectangle 19"/>
+          <p:cNvSpPr/>
+          <p:nvPr/>
+        </p:nvSpPr>
+        <p:spPr>
+          <a:xfrm>
+            <a:off x="3433010" y="5037074"/>
+            <a:ext cx="1443790" cy="2103912"/>
+          </a:xfrm>
+          <a:prstGeom prst="rect">
+            <a:avLst/>
+          </a:prstGeom>
+        </p:spPr>
+        <p:style>
+          <a:lnRef idx="2">
+            <a:schemeClr val="dk1"/>
+          </a:lnRef>
+          <a:fillRef idx="1">
+            <a:schemeClr val="lt1"/>
+          </a:fillRef>
+          <a:effectRef idx="0">
+            <a:schemeClr val="dk1"/>
+          </a:effectRef>
+          <a:fontRef idx="minor">
+            <a:schemeClr val="dk1"/>
+          </a:fontRef>
+        </p:style>
+        <p:txBody>
+          <a:bodyPr rtlCol="0" anchor="ctr"/>
+          <a:lstStyle/>
+          <a:p>
+            <a:pPr algn="ctr"/>
+            <a:r>
+              <a:rPr lang="fr-FR" sz="1400" b="1" dirty="0"/>
+              <a:t>Chantage</a:t>
+            </a:r>
+          </a:p>
+          <a:p>
+            <a:pPr algn="ctr"/>
+            <a:endParaRPr lang="fr-FR" sz="1400" dirty="0"/>
+          </a:p>
+          <a:p>
+            <a:pPr algn="ctr"/>
+            <a:r>
+              <a:rPr lang="fr-FR" sz="1400" dirty="0"/>
+              <a:t>Prenez un marqueur spécial loyauté rouge ou bleu et mettez-le face visible sur un espion</a:t>
+            </a:r>
+            <a:endParaRPr lang="fr-FR" sz="1100" dirty="0"/>
+          </a:p>
+        </p:txBody>
+      </p:sp>
+      <p:sp>
+        <p:nvSpPr>
+          <p:cNvPr id="25" name="Rectangle 24"/>
+          <p:cNvSpPr/>
+          <p:nvPr/>
+        </p:nvSpPr>
+        <p:spPr>
+          <a:xfrm>
+            <a:off x="5017168" y="5037072"/>
+            <a:ext cx="1443790" cy="2103914"/>
+          </a:xfrm>
+          <a:prstGeom prst="rect">
+            <a:avLst/>
+          </a:prstGeom>
+        </p:spPr>
+        <p:style>
+          <a:lnRef idx="2">
+            <a:schemeClr val="dk1"/>
+          </a:lnRef>
+          <a:fillRef idx="1">
+            <a:schemeClr val="lt1"/>
+          </a:fillRef>
+          <a:effectRef idx="0">
+            <a:schemeClr val="dk1"/>
+          </a:effectRef>
+          <a:fontRef idx="minor">
+            <a:schemeClr val="dk1"/>
+          </a:fontRef>
+        </p:style>
+        <p:txBody>
+          <a:bodyPr rtlCol="0" anchor="ctr"/>
+          <a:lstStyle/>
+          <a:p>
+            <a:pPr algn="ctr"/>
+            <a:r>
+              <a:rPr lang="fr-FR" sz="1100" b="1" dirty="0" smtClean="0"/>
+              <a:t>Nid d’espions</a:t>
+            </a:r>
+            <a:endParaRPr lang="fr-FR" sz="1100" b="1" dirty="0" smtClean="0"/>
+          </a:p>
+          <a:p>
+            <a:pPr algn="ctr"/>
             <a:endParaRPr lang="fr-FR" sz="1000" dirty="0"/>
           </a:p>
           <a:p>
             <a:pPr algn="ctr"/>
             <a:r>
               <a:rPr lang="fr-FR" sz="1000" dirty="0" smtClean="0"/>
-              <a:t>Regardez secrètement les </a:t>
-            </a:r>
-            <a:r>
-              <a:rPr lang="fr-FR" sz="1000" dirty="0" err="1" smtClean="0"/>
-              <a:t>tokens</a:t>
-            </a:r>
-            <a:r>
-              <a:rPr lang="fr-FR" sz="1000" dirty="0" smtClean="0"/>
-              <a:t> de 2 agents.</a:t>
-            </a:r>
-          </a:p>
-          <a:p>
-            <a:pPr algn="ctr"/>
-            <a:r>
-              <a:rPr lang="fr-FR" sz="1000" dirty="0" smtClean="0"/>
-              <a:t>Gardez cette carte devant vous, elle rapporte 1 point en fin de partie.</a:t>
+              <a:t>Prenez le premier espion du paquet espion, ajoutez-le dans la zone de jeu. </a:t>
             </a:r>
             <a:endParaRPr lang="fr-FR" sz="1000" dirty="0"/>
           </a:p>
@@ -4740,8 +5403,8 @@
           <a:lstStyle/>
           <a:p>
             <a:r>
-              <a:rPr lang="fr-FR" dirty="0" err="1" smtClean="0"/>
-              <a:t>Tokens</a:t>
+              <a:rPr lang="fr-FR" dirty="0" smtClean="0"/>
+              <a:t>marqueurs</a:t>
             </a:r>
             <a:endParaRPr lang="fr-FR" dirty="0"/>
           </a:p>
@@ -4784,7 +5447,11 @@
           <a:lstStyle/>
           <a:p>
             <a:pPr algn="ctr"/>
-            <a:endParaRPr lang="fr-FR"/>
+            <a:r>
+              <a:rPr lang="fr-FR" dirty="0" smtClean="0"/>
+              <a:t>C</a:t>
+            </a:r>
+            <a:endParaRPr lang="fr-FR" dirty="0"/>
           </a:p>
         </p:txBody>
       </p:sp>
@@ -4825,7 +5492,11 @@
           <a:lstStyle/>
           <a:p>
             <a:pPr algn="ctr"/>
-            <a:endParaRPr lang="fr-FR"/>
+            <a:r>
+              <a:rPr lang="fr-FR" dirty="0" smtClean="0"/>
+              <a:t>C</a:t>
+            </a:r>
+            <a:endParaRPr lang="fr-FR" dirty="0"/>
           </a:p>
         </p:txBody>
       </p:sp>
@@ -4866,7 +5537,11 @@
           <a:lstStyle/>
           <a:p>
             <a:pPr algn="ctr"/>
-            <a:endParaRPr lang="fr-FR"/>
+            <a:r>
+              <a:rPr lang="fr-FR" dirty="0" smtClean="0"/>
+              <a:t>C</a:t>
+            </a:r>
+            <a:endParaRPr lang="fr-FR" dirty="0"/>
           </a:p>
         </p:txBody>
       </p:sp>
@@ -4904,7 +5579,11 @@
           <a:lstStyle/>
           <a:p>
             <a:pPr algn="ctr"/>
-            <a:endParaRPr lang="fr-FR"/>
+            <a:r>
+              <a:rPr lang="fr-FR" dirty="0" smtClean="0"/>
+              <a:t>C</a:t>
+            </a:r>
+            <a:endParaRPr lang="fr-FR" dirty="0"/>
           </a:p>
         </p:txBody>
       </p:sp>
@@ -4942,7 +5621,11 @@
           <a:lstStyle/>
           <a:p>
             <a:pPr algn="ctr"/>
-            <a:endParaRPr lang="fr-FR"/>
+            <a:r>
+              <a:rPr lang="fr-FR" dirty="0" smtClean="0"/>
+              <a:t>C</a:t>
+            </a:r>
+            <a:endParaRPr lang="fr-FR" dirty="0"/>
           </a:p>
         </p:txBody>
       </p:sp>
@@ -4983,7 +5666,11 @@
           <a:lstStyle/>
           <a:p>
             <a:pPr algn="ctr"/>
-            <a:endParaRPr lang="fr-FR"/>
+            <a:r>
+              <a:rPr lang="fr-FR" dirty="0" smtClean="0"/>
+              <a:t>C</a:t>
+            </a:r>
+            <a:endParaRPr lang="fr-FR" dirty="0"/>
           </a:p>
         </p:txBody>
       </p:sp>
@@ -5024,7 +5711,11 @@
           <a:lstStyle/>
           <a:p>
             <a:pPr algn="ctr"/>
-            <a:endParaRPr lang="fr-FR"/>
+            <a:r>
+              <a:rPr lang="fr-FR" dirty="0" smtClean="0"/>
+              <a:t>C</a:t>
+            </a:r>
+            <a:endParaRPr lang="fr-FR" dirty="0"/>
           </a:p>
         </p:txBody>
       </p:sp>
@@ -5065,7 +5756,11 @@
           <a:lstStyle/>
           <a:p>
             <a:pPr algn="ctr"/>
-            <a:endParaRPr lang="fr-FR"/>
+            <a:r>
+              <a:rPr lang="fr-FR" dirty="0" smtClean="0"/>
+              <a:t>C</a:t>
+            </a:r>
+            <a:endParaRPr lang="fr-FR" dirty="0"/>
           </a:p>
         </p:txBody>
       </p:sp>
@@ -5106,7 +5801,11 @@
           <a:lstStyle/>
           <a:p>
             <a:pPr algn="ctr"/>
-            <a:endParaRPr lang="fr-FR"/>
+            <a:r>
+              <a:rPr lang="fr-FR" dirty="0" smtClean="0"/>
+              <a:t>C</a:t>
+            </a:r>
+            <a:endParaRPr lang="fr-FR" dirty="0"/>
           </a:p>
         </p:txBody>
       </p:sp>
@@ -5144,7 +5843,11 @@
           <a:lstStyle/>
           <a:p>
             <a:pPr algn="ctr"/>
-            <a:endParaRPr lang="fr-FR"/>
+            <a:r>
+              <a:rPr lang="fr-FR" dirty="0" smtClean="0"/>
+              <a:t>C</a:t>
+            </a:r>
+            <a:endParaRPr lang="fr-FR" dirty="0"/>
           </a:p>
         </p:txBody>
       </p:sp>
@@ -5182,7 +5885,11 @@
           <a:lstStyle/>
           <a:p>
             <a:pPr algn="ctr"/>
-            <a:endParaRPr lang="fr-FR"/>
+            <a:r>
+              <a:rPr lang="fr-FR" dirty="0" smtClean="0"/>
+              <a:t>C</a:t>
+            </a:r>
+            <a:endParaRPr lang="fr-FR" dirty="0"/>
           </a:p>
         </p:txBody>
       </p:sp>
@@ -5223,7 +5930,11 @@
           <a:lstStyle/>
           <a:p>
             <a:pPr algn="ctr"/>
-            <a:endParaRPr lang="fr-FR"/>
+            <a:r>
+              <a:rPr lang="fr-FR" dirty="0" smtClean="0"/>
+              <a:t>C</a:t>
+            </a:r>
+            <a:endParaRPr lang="fr-FR" dirty="0"/>
           </a:p>
         </p:txBody>
       </p:sp>
@@ -5264,7 +5975,11 @@
           <a:lstStyle/>
           <a:p>
             <a:pPr algn="ctr"/>
-            <a:endParaRPr lang="fr-FR"/>
+            <a:r>
+              <a:rPr lang="fr-FR" dirty="0" smtClean="0"/>
+              <a:t>T</a:t>
+            </a:r>
+            <a:endParaRPr lang="fr-FR" dirty="0"/>
           </a:p>
         </p:txBody>
       </p:sp>
@@ -5305,7 +6020,11 @@
           <a:lstStyle/>
           <a:p>
             <a:pPr algn="ctr"/>
-            <a:endParaRPr lang="fr-FR"/>
+            <a:r>
+              <a:rPr lang="fr-FR" dirty="0" smtClean="0"/>
+              <a:t>T</a:t>
+            </a:r>
+            <a:endParaRPr lang="fr-FR" dirty="0"/>
           </a:p>
         </p:txBody>
       </p:sp>
@@ -5345,11 +6064,18 @@
             <a:pPr algn="ctr"/>
             <a:r>
               <a:rPr lang="fr-FR" sz="800" dirty="0" smtClean="0"/>
-              <a:t>+2 </a:t>
-            </a:r>
+              <a:t>T</a:t>
+            </a:r>
+          </a:p>
+          <a:p>
+            <a:pPr algn="ctr"/>
             <a:r>
               <a:rPr lang="fr-FR" sz="800" dirty="0" smtClean="0"/>
-              <a:t>PV</a:t>
+              <a:t>+</a:t>
+            </a:r>
+            <a:r>
+              <a:rPr lang="fr-FR" sz="800" dirty="0" smtClean="0"/>
+              <a:t>2 PV</a:t>
             </a:r>
             <a:endParaRPr lang="fr-FR" sz="800" dirty="0"/>
           </a:p>
@@ -5387,6 +6113,17 @@
         <p:txBody>
           <a:bodyPr rtlCol="0" anchor="ctr"/>
           <a:lstStyle/>
+          <a:p>
+            <a:pPr lvl="0" algn="ctr"/>
+            <a:r>
+              <a:rPr lang="fr-FR" sz="800" dirty="0" smtClean="0">
+                <a:solidFill>
+                  <a:prstClr val="black"/>
+                </a:solidFill>
+              </a:rPr>
+              <a:t>T</a:t>
+            </a:r>
+          </a:p>
           <a:p>
             <a:pPr lvl="0" algn="ctr"/>
             <a:r>
@@ -5450,7 +6187,11 @@
           <a:lstStyle/>
           <a:p>
             <a:pPr algn="ctr"/>
-            <a:endParaRPr lang="fr-FR"/>
+            <a:r>
+              <a:rPr lang="fr-FR" dirty="0" smtClean="0"/>
+              <a:t>T</a:t>
+            </a:r>
+            <a:endParaRPr lang="fr-FR" dirty="0"/>
           </a:p>
         </p:txBody>
       </p:sp>
@@ -5491,7 +6232,11 @@
           <a:lstStyle/>
           <a:p>
             <a:pPr algn="ctr"/>
-            <a:endParaRPr lang="fr-FR"/>
+            <a:r>
+              <a:rPr lang="fr-FR" dirty="0" smtClean="0"/>
+              <a:t>T</a:t>
+            </a:r>
+            <a:endParaRPr lang="fr-FR" dirty="0"/>
           </a:p>
         </p:txBody>
       </p:sp>
@@ -5532,7 +6277,11 @@
           <a:lstStyle/>
           <a:p>
             <a:pPr algn="ctr"/>
-            <a:endParaRPr lang="fr-FR"/>
+            <a:r>
+              <a:rPr lang="fr-FR" dirty="0" smtClean="0"/>
+              <a:t>T</a:t>
+            </a:r>
+            <a:endParaRPr lang="fr-FR" dirty="0"/>
           </a:p>
         </p:txBody>
       </p:sp>
@@ -5573,19 +6322,23 @@
           <a:lstStyle/>
           <a:p>
             <a:pPr algn="ctr"/>
-            <a:endParaRPr lang="fr-FR"/>
-          </a:p>
-        </p:txBody>
-      </p:sp>
-      <p:sp>
-        <p:nvSpPr>
-          <p:cNvPr id="34" name="Ellipse 33"/>
+            <a:r>
+              <a:rPr lang="fr-FR" dirty="0" smtClean="0"/>
+              <a:t>T</a:t>
+            </a:r>
+            <a:endParaRPr lang="fr-FR" dirty="0"/>
+          </a:p>
+        </p:txBody>
+      </p:sp>
+      <p:sp>
+        <p:nvSpPr>
+          <p:cNvPr id="39" name="Ellipse 38"/>
           <p:cNvSpPr/>
           <p:nvPr/>
         </p:nvSpPr>
         <p:spPr>
           <a:xfrm>
-            <a:off x="3549317" y="2385070"/>
+            <a:off x="2250227" y="4569367"/>
             <a:ext cx="628690" cy="643437"/>
           </a:xfrm>
           <a:prstGeom prst="ellipse">
@@ -5610,24 +6363,35 @@
           <a:bodyPr rtlCol="0" anchor="ctr"/>
           <a:lstStyle/>
           <a:p>
-            <a:pPr lvl="0" algn="ctr"/>
-            <a:endParaRPr lang="fr-FR" sz="1000" dirty="0">
-              <a:solidFill>
-                <a:prstClr val="black"/>
-              </a:solidFill>
-            </a:endParaRPr>
-          </a:p>
-        </p:txBody>
-      </p:sp>
-      <p:sp>
-        <p:nvSpPr>
-          <p:cNvPr id="36" name="Ellipse 35"/>
+            <a:pPr algn="ctr"/>
+            <a:r>
+              <a:rPr lang="fr-FR" sz="800" dirty="0" smtClean="0"/>
+              <a:t>T</a:t>
+            </a:r>
+          </a:p>
+          <a:p>
+            <a:pPr algn="ctr"/>
+            <a:r>
+              <a:rPr lang="fr-FR" sz="800" dirty="0" smtClean="0"/>
+              <a:t>+</a:t>
+            </a:r>
+            <a:r>
+              <a:rPr lang="fr-FR" sz="800" dirty="0" smtClean="0"/>
+              <a:t>2 PV</a:t>
+            </a:r>
+            <a:endParaRPr lang="fr-FR" sz="800" dirty="0"/>
+          </a:p>
+        </p:txBody>
+      </p:sp>
+      <p:sp>
+        <p:nvSpPr>
+          <p:cNvPr id="40" name="Ellipse 39"/>
           <p:cNvSpPr/>
           <p:nvPr/>
         </p:nvSpPr>
         <p:spPr>
           <a:xfrm>
-            <a:off x="3549317" y="4569367"/>
+            <a:off x="2895922" y="4569367"/>
             <a:ext cx="628690" cy="643437"/>
           </a:xfrm>
           <a:prstGeom prst="ellipse">
@@ -5653,92 +6417,15 @@
           <a:lstStyle/>
           <a:p>
             <a:pPr lvl="0" algn="ctr"/>
-            <a:endParaRPr lang="fr-FR" sz="1000" dirty="0">
-              <a:solidFill>
-                <a:prstClr val="black"/>
-              </a:solidFill>
-            </a:endParaRPr>
-          </a:p>
-        </p:txBody>
-      </p:sp>
-      <p:sp>
-        <p:nvSpPr>
-          <p:cNvPr id="39" name="Ellipse 38"/>
-          <p:cNvSpPr/>
-          <p:nvPr/>
-        </p:nvSpPr>
-        <p:spPr>
-          <a:xfrm>
-            <a:off x="2250227" y="4569367"/>
-            <a:ext cx="628690" cy="643437"/>
-          </a:xfrm>
-          <a:prstGeom prst="ellipse">
-            <a:avLst/>
-          </a:prstGeom>
-        </p:spPr>
-        <p:style>
-          <a:lnRef idx="2">
-            <a:schemeClr val="dk1"/>
-          </a:lnRef>
-          <a:fillRef idx="1">
-            <a:schemeClr val="lt1"/>
-          </a:fillRef>
-          <a:effectRef idx="0">
-            <a:schemeClr val="dk1"/>
-          </a:effectRef>
-          <a:fontRef idx="minor">
-            <a:schemeClr val="dk1"/>
-          </a:fontRef>
-        </p:style>
-        <p:txBody>
-          <a:bodyPr rtlCol="0" anchor="ctr"/>
-          <a:lstStyle/>
-          <a:p>
-            <a:pPr algn="ctr"/>
-            <a:r>
-              <a:rPr lang="fr-FR" sz="800" dirty="0" smtClean="0"/>
-              <a:t>+2 </a:t>
-            </a:r>
-            <a:r>
-              <a:rPr lang="fr-FR" sz="800" dirty="0" smtClean="0"/>
-              <a:t>PV</a:t>
-            </a:r>
-            <a:endParaRPr lang="fr-FR" sz="800" dirty="0"/>
-          </a:p>
-        </p:txBody>
-      </p:sp>
-      <p:sp>
-        <p:nvSpPr>
-          <p:cNvPr id="40" name="Ellipse 39"/>
-          <p:cNvSpPr/>
-          <p:nvPr/>
-        </p:nvSpPr>
-        <p:spPr>
-          <a:xfrm>
-            <a:off x="2895922" y="4569367"/>
-            <a:ext cx="628690" cy="643437"/>
-          </a:xfrm>
-          <a:prstGeom prst="ellipse">
-            <a:avLst/>
-          </a:prstGeom>
-        </p:spPr>
-        <p:style>
-          <a:lnRef idx="2">
-            <a:schemeClr val="dk1"/>
-          </a:lnRef>
-          <a:fillRef idx="1">
-            <a:schemeClr val="lt1"/>
-          </a:fillRef>
-          <a:effectRef idx="0">
-            <a:schemeClr val="dk1"/>
-          </a:effectRef>
-          <a:fontRef idx="minor">
-            <a:schemeClr val="dk1"/>
-          </a:fontRef>
-        </p:style>
-        <p:txBody>
-          <a:bodyPr rtlCol="0" anchor="ctr"/>
-          <a:lstStyle/>
+            <a:r>
+              <a:rPr lang="fr-FR" sz="800" dirty="0" smtClean="0">
+                <a:solidFill>
+                  <a:prstClr val="black"/>
+                </a:solidFill>
+              </a:rPr>
+              <a:t>T</a:t>
+            </a:r>
+          </a:p>
           <a:p>
             <a:pPr lvl="0" algn="ctr"/>
             <a:r>
@@ -5762,6 +6449,300 @@
                 <a:prstClr val="black"/>
               </a:solidFill>
             </a:endParaRPr>
+          </a:p>
+        </p:txBody>
+      </p:sp>
+      <p:sp>
+        <p:nvSpPr>
+          <p:cNvPr id="28" name="Ellipse 27"/>
+          <p:cNvSpPr/>
+          <p:nvPr/>
+        </p:nvSpPr>
+        <p:spPr>
+          <a:xfrm>
+            <a:off x="8225590" y="2898417"/>
+            <a:ext cx="628690" cy="643437"/>
+          </a:xfrm>
+          <a:prstGeom prst="ellipse">
+            <a:avLst/>
+          </a:prstGeom>
+        </p:spPr>
+        <p:style>
+          <a:lnRef idx="2">
+            <a:schemeClr val="dk1"/>
+          </a:lnRef>
+          <a:fillRef idx="1">
+            <a:schemeClr val="lt1"/>
+          </a:fillRef>
+          <a:effectRef idx="0">
+            <a:schemeClr val="dk1"/>
+          </a:effectRef>
+          <a:fontRef idx="minor">
+            <a:schemeClr val="dk1"/>
+          </a:fontRef>
+        </p:style>
+        <p:txBody>
+          <a:bodyPr rtlCol="0" anchor="ctr"/>
+          <a:lstStyle/>
+          <a:p>
+            <a:pPr algn="ctr"/>
+            <a:r>
+              <a:rPr lang="fr-FR" sz="800" dirty="0" smtClean="0"/>
+              <a:t>T</a:t>
+            </a:r>
+          </a:p>
+          <a:p>
+            <a:pPr algn="ctr"/>
+            <a:r>
+              <a:rPr lang="fr-FR" sz="800" dirty="0" smtClean="0"/>
+              <a:t>+3 </a:t>
+            </a:r>
+            <a:r>
+              <a:rPr lang="fr-FR" sz="800" dirty="0" smtClean="0"/>
+              <a:t>PV</a:t>
+            </a:r>
+            <a:endParaRPr lang="fr-FR" sz="800" dirty="0"/>
+          </a:p>
+        </p:txBody>
+      </p:sp>
+      <p:sp>
+        <p:nvSpPr>
+          <p:cNvPr id="29" name="Ellipse 28"/>
+          <p:cNvSpPr/>
+          <p:nvPr/>
+        </p:nvSpPr>
+        <p:spPr>
+          <a:xfrm>
+            <a:off x="8871285" y="2898417"/>
+            <a:ext cx="628690" cy="643437"/>
+          </a:xfrm>
+          <a:prstGeom prst="ellipse">
+            <a:avLst/>
+          </a:prstGeom>
+        </p:spPr>
+        <p:style>
+          <a:lnRef idx="2">
+            <a:schemeClr val="dk1"/>
+          </a:lnRef>
+          <a:fillRef idx="1">
+            <a:schemeClr val="lt1"/>
+          </a:fillRef>
+          <a:effectRef idx="0">
+            <a:schemeClr val="dk1"/>
+          </a:effectRef>
+          <a:fontRef idx="minor">
+            <a:schemeClr val="dk1"/>
+          </a:fontRef>
+        </p:style>
+        <p:txBody>
+          <a:bodyPr rtlCol="0" anchor="ctr"/>
+          <a:lstStyle/>
+          <a:p>
+            <a:pPr lvl="0" algn="ctr"/>
+            <a:r>
+              <a:rPr lang="fr-FR" sz="800" dirty="0" smtClean="0">
+                <a:solidFill>
+                  <a:prstClr val="black"/>
+                </a:solidFill>
+              </a:rPr>
+              <a:t>T</a:t>
+            </a:r>
+          </a:p>
+          <a:p>
+            <a:pPr lvl="0" algn="ctr"/>
+            <a:r>
+              <a:rPr lang="fr-FR" sz="800" dirty="0" smtClean="0">
+                <a:solidFill>
+                  <a:prstClr val="black"/>
+                </a:solidFill>
+              </a:rPr>
+              <a:t>- 3PV</a:t>
+            </a:r>
+            <a:endParaRPr lang="fr-FR" sz="800" dirty="0">
+              <a:solidFill>
+                <a:prstClr val="black"/>
+              </a:solidFill>
+            </a:endParaRPr>
+          </a:p>
+        </p:txBody>
+      </p:sp>
+      <p:sp>
+        <p:nvSpPr>
+          <p:cNvPr id="32" name="Ellipse 31"/>
+          <p:cNvSpPr/>
+          <p:nvPr/>
+        </p:nvSpPr>
+        <p:spPr>
+          <a:xfrm>
+            <a:off x="6951205" y="3246767"/>
+            <a:ext cx="628690" cy="643437"/>
+          </a:xfrm>
+          <a:prstGeom prst="ellipse">
+            <a:avLst/>
+          </a:prstGeom>
+          <a:solidFill>
+            <a:schemeClr val="accent1"/>
+          </a:solidFill>
+        </p:spPr>
+        <p:style>
+          <a:lnRef idx="2">
+            <a:schemeClr val="dk1"/>
+          </a:lnRef>
+          <a:fillRef idx="1">
+            <a:schemeClr val="lt1"/>
+          </a:fillRef>
+          <a:effectRef idx="0">
+            <a:schemeClr val="dk1"/>
+          </a:effectRef>
+          <a:fontRef idx="minor">
+            <a:schemeClr val="dk1"/>
+          </a:fontRef>
+        </p:style>
+        <p:txBody>
+          <a:bodyPr rtlCol="0" anchor="ctr"/>
+          <a:lstStyle/>
+          <a:p>
+            <a:pPr algn="ctr"/>
+            <a:r>
+              <a:rPr lang="fr-FR" dirty="0" smtClean="0"/>
+              <a:t>S</a:t>
+            </a:r>
+            <a:endParaRPr lang="fr-FR" dirty="0"/>
+          </a:p>
+        </p:txBody>
+      </p:sp>
+      <p:sp>
+        <p:nvSpPr>
+          <p:cNvPr id="33" name="Ellipse 32"/>
+          <p:cNvSpPr/>
+          <p:nvPr/>
+        </p:nvSpPr>
+        <p:spPr>
+          <a:xfrm>
+            <a:off x="7596900" y="3220135"/>
+            <a:ext cx="628690" cy="643437"/>
+          </a:xfrm>
+          <a:prstGeom prst="ellipse">
+            <a:avLst/>
+          </a:prstGeom>
+          <a:solidFill>
+            <a:srgbClr val="C00000"/>
+          </a:solidFill>
+        </p:spPr>
+        <p:style>
+          <a:lnRef idx="2">
+            <a:schemeClr val="dk1"/>
+          </a:lnRef>
+          <a:fillRef idx="1">
+            <a:schemeClr val="lt1"/>
+          </a:fillRef>
+          <a:effectRef idx="0">
+            <a:schemeClr val="dk1"/>
+          </a:effectRef>
+          <a:fontRef idx="minor">
+            <a:schemeClr val="dk1"/>
+          </a:fontRef>
+        </p:style>
+        <p:txBody>
+          <a:bodyPr rtlCol="0" anchor="ctr"/>
+          <a:lstStyle/>
+          <a:p>
+            <a:pPr algn="ctr"/>
+            <a:r>
+              <a:rPr lang="fr-FR" dirty="0" smtClean="0"/>
+              <a:t>S</a:t>
+            </a:r>
+            <a:endParaRPr lang="fr-FR" dirty="0"/>
+          </a:p>
+        </p:txBody>
+      </p:sp>
+      <p:sp>
+        <p:nvSpPr>
+          <p:cNvPr id="35" name="Ellipse 34"/>
+          <p:cNvSpPr/>
+          <p:nvPr/>
+        </p:nvSpPr>
+        <p:spPr>
+          <a:xfrm>
+            <a:off x="6951205" y="2576698"/>
+            <a:ext cx="628690" cy="643437"/>
+          </a:xfrm>
+          <a:prstGeom prst="ellipse">
+            <a:avLst/>
+          </a:prstGeom>
+          <a:solidFill>
+            <a:schemeClr val="accent1"/>
+          </a:solidFill>
+        </p:spPr>
+        <p:style>
+          <a:lnRef idx="2">
+            <a:schemeClr val="dk1"/>
+          </a:lnRef>
+          <a:fillRef idx="1">
+            <a:schemeClr val="lt1"/>
+          </a:fillRef>
+          <a:effectRef idx="0">
+            <a:schemeClr val="dk1"/>
+          </a:effectRef>
+          <a:fontRef idx="minor">
+            <a:schemeClr val="dk1"/>
+          </a:fontRef>
+        </p:style>
+        <p:txBody>
+          <a:bodyPr rtlCol="0" anchor="ctr"/>
+          <a:lstStyle/>
+          <a:p>
+            <a:pPr algn="ctr"/>
+            <a:r>
+              <a:rPr lang="fr-FR" dirty="0" smtClean="0"/>
+              <a:t>S</a:t>
+            </a:r>
+            <a:endParaRPr lang="fr-FR" dirty="0"/>
+          </a:p>
+        </p:txBody>
+      </p:sp>
+      <p:sp>
+        <p:nvSpPr>
+          <p:cNvPr id="37" name="Ellipse 36"/>
+          <p:cNvSpPr/>
+          <p:nvPr/>
+        </p:nvSpPr>
+        <p:spPr>
+          <a:xfrm>
+            <a:off x="7596900" y="2550066"/>
+            <a:ext cx="628690" cy="643437"/>
+          </a:xfrm>
+          <a:prstGeom prst="ellipse">
+            <a:avLst/>
+          </a:prstGeom>
+          <a:solidFill>
+            <a:srgbClr val="C00000"/>
+          </a:solidFill>
+        </p:spPr>
+        <p:style>
+          <a:lnRef idx="2">
+            <a:schemeClr val="dk1"/>
+          </a:lnRef>
+          <a:fillRef idx="1">
+            <a:schemeClr val="lt1"/>
+          </a:fillRef>
+          <a:effectRef idx="0">
+            <a:schemeClr val="dk1"/>
+          </a:effectRef>
+          <a:fontRef idx="minor">
+            <a:schemeClr val="dk1"/>
+          </a:fontRef>
+        </p:style>
+        <p:txBody>
+          <a:bodyPr rtlCol="0" anchor="ctr"/>
+          <a:lstStyle/>
+          <a:p>
+            <a:pPr algn="ctr"/>
+            <a:r>
+              <a:rPr lang="fr-FR" dirty="0" smtClean="0"/>
+              <a:t>S</a:t>
+            </a:r>
+            <a:endParaRPr lang="fr-FR" dirty="0"/>
           </a:p>
         </p:txBody>
       </p:sp>
@@ -6044,4 +7025,265 @@
     </a:ext>
   </a:extLst>
 </a:theme>
+</file>
+
+<file path=ppt/theme/theme2.xml><?xml version="1.0" encoding="utf-8"?>
+<a:theme xmlns:a="http://schemas.openxmlformats.org/drawingml/2006/main" name="Thème Office">
+  <a:themeElements>
+    <a:clrScheme name="Office">
+      <a:dk1>
+        <a:sysClr val="windowText" lastClr="000000"/>
+      </a:dk1>
+      <a:lt1>
+        <a:sysClr val="window" lastClr="FFFFFF"/>
+      </a:lt1>
+      <a:dk2>
+        <a:srgbClr val="44546A"/>
+      </a:dk2>
+      <a:lt2>
+        <a:srgbClr val="E7E6E6"/>
+      </a:lt2>
+      <a:accent1>
+        <a:srgbClr val="5B9BD5"/>
+      </a:accent1>
+      <a:accent2>
+        <a:srgbClr val="ED7D31"/>
+      </a:accent2>
+      <a:accent3>
+        <a:srgbClr val="A5A5A5"/>
+      </a:accent3>
+      <a:accent4>
+        <a:srgbClr val="FFC000"/>
+      </a:accent4>
+      <a:accent5>
+        <a:srgbClr val="4472C4"/>
+      </a:accent5>
+      <a:accent6>
+        <a:srgbClr val="70AD47"/>
+      </a:accent6>
+      <a:hlink>
+        <a:srgbClr val="0563C1"/>
+      </a:hlink>
+      <a:folHlink>
+        <a:srgbClr val="954F72"/>
+      </a:folHlink>
+    </a:clrScheme>
+    <a:fontScheme name="Office">
+      <a:majorFont>
+        <a:latin typeface="Calibri Light" panose="020F0302020204030204"/>
+        <a:ea typeface=""/>
+        <a:cs typeface=""/>
+        <a:font script="Jpan" typeface="ＭＳ Ｐゴシック"/>
+        <a:font script="Hang" typeface="맑은 고딕"/>
+        <a:font script="Hans" typeface="宋体"/>
+        <a:font script="Hant" typeface="新細明體"/>
+        <a:font script="Arab" typeface="Times New Roman"/>
+        <a:font script="Hebr" typeface="Times New Roman"/>
+        <a:font script="Thai" typeface="Angsana New"/>
+        <a:font script="Ethi" typeface="Nyala"/>
+        <a:font script="Beng" typeface="Vrinda"/>
+        <a:font script="Gujr" typeface="Shruti"/>
+        <a:font script="Khmr" typeface="MoolBoran"/>
+        <a:font script="Knda" typeface="Tunga"/>
+        <a:font script="Guru" typeface="Raavi"/>
+        <a:font script="Cans" typeface="Euphemia"/>
+        <a:font script="Cher" typeface="Plantagenet Cherokee"/>
+        <a:font script="Yiii" typeface="Microsoft Yi Baiti"/>
+        <a:font script="Tibt" typeface="Microsoft Himalaya"/>
+        <a:font script="Thaa" typeface="MV Boli"/>
+        <a:font script="Deva" typeface="Mangal"/>
+        <a:font script="Telu" typeface="Gautami"/>
+        <a:font script="Taml" typeface="Latha"/>
+        <a:font script="Syrc" typeface="Estrangelo Edessa"/>
+        <a:font script="Orya" typeface="Kalinga"/>
+        <a:font script="Mlym" typeface="Kartika"/>
+        <a:font script="Laoo" typeface="DokChampa"/>
+        <a:font script="Sinh" typeface="Iskoola Pota"/>
+        <a:font script="Mong" typeface="Mongolian Baiti"/>
+        <a:font script="Viet" typeface="Times New Roman"/>
+        <a:font script="Uigh" typeface="Microsoft Uighur"/>
+        <a:font script="Geor" typeface="Sylfaen"/>
+      </a:majorFont>
+      <a:minorFont>
+        <a:latin typeface="Calibri" panose="020F0502020204030204"/>
+        <a:ea typeface=""/>
+        <a:cs typeface=""/>
+        <a:font script="Jpan" typeface="ＭＳ Ｐゴシック"/>
+        <a:font script="Hang" typeface="맑은 고딕"/>
+        <a:font script="Hans" typeface="宋体"/>
+        <a:font script="Hant" typeface="新細明體"/>
+        <a:font script="Arab" typeface="Arial"/>
+        <a:font script="Hebr" typeface="Arial"/>
+        <a:font script="Thai" typeface="Cordia New"/>
+        <a:font script="Ethi" typeface="Nyala"/>
+        <a:font script="Beng" typeface="Vrinda"/>
+        <a:font script="Gujr" typeface="Shruti"/>
+        <a:font script="Khmr" typeface="DaunPenh"/>
+        <a:font script="Knda" typeface="Tunga"/>
+        <a:font script="Guru" typeface="Raavi"/>
+        <a:font script="Cans" typeface="Euphemia"/>
+        <a:font script="Cher" typeface="Plantagenet Cherokee"/>
+        <a:font script="Yiii" typeface="Microsoft Yi Baiti"/>
+        <a:font script="Tibt" typeface="Microsoft Himalaya"/>
+        <a:font script="Thaa" typeface="MV Boli"/>
+        <a:font script="Deva" typeface="Mangal"/>
+        <a:font script="Telu" typeface="Gautami"/>
+        <a:font script="Taml" typeface="Latha"/>
+        <a:font script="Syrc" typeface="Estrangelo Edessa"/>
+        <a:font script="Orya" typeface="Kalinga"/>
+        <a:font script="Mlym" typeface="Kartika"/>
+        <a:font script="Laoo" typeface="DokChampa"/>
+        <a:font script="Sinh" typeface="Iskoola Pota"/>
+        <a:font script="Mong" typeface="Mongolian Baiti"/>
+        <a:font script="Viet" typeface="Arial"/>
+        <a:font script="Uigh" typeface="Microsoft Uighur"/>
+        <a:font script="Geor" typeface="Sylfaen"/>
+      </a:minorFont>
+    </a:fontScheme>
+    <a:fmtScheme name="Office">
+      <a:fillStyleLst>
+        <a:solidFill>
+          <a:schemeClr val="phClr"/>
+        </a:solidFill>
+        <a:gradFill rotWithShape="1">
+          <a:gsLst>
+            <a:gs pos="0">
+              <a:schemeClr val="phClr">
+                <a:lumMod val="110000"/>
+                <a:satMod val="105000"/>
+                <a:tint val="67000"/>
+              </a:schemeClr>
+            </a:gs>
+            <a:gs pos="50000">
+              <a:schemeClr val="phClr">
+                <a:lumMod val="105000"/>
+                <a:satMod val="103000"/>
+                <a:tint val="73000"/>
+              </a:schemeClr>
+            </a:gs>
+            <a:gs pos="100000">
+              <a:schemeClr val="phClr">
+                <a:lumMod val="105000"/>
+                <a:satMod val="109000"/>
+                <a:tint val="81000"/>
+              </a:schemeClr>
+            </a:gs>
+          </a:gsLst>
+          <a:lin ang="5400000" scaled="0"/>
+        </a:gradFill>
+        <a:gradFill rotWithShape="1">
+          <a:gsLst>
+            <a:gs pos="0">
+              <a:schemeClr val="phClr">
+                <a:satMod val="103000"/>
+                <a:lumMod val="102000"/>
+                <a:tint val="94000"/>
+              </a:schemeClr>
+            </a:gs>
+            <a:gs pos="50000">
+              <a:schemeClr val="phClr">
+                <a:satMod val="110000"/>
+                <a:lumMod val="100000"/>
+                <a:shade val="100000"/>
+              </a:schemeClr>
+            </a:gs>
+            <a:gs pos="100000">
+              <a:schemeClr val="phClr">
+                <a:lumMod val="99000"/>
+                <a:satMod val="120000"/>
+                <a:shade val="78000"/>
+              </a:schemeClr>
+            </a:gs>
+          </a:gsLst>
+          <a:lin ang="5400000" scaled="0"/>
+        </a:gradFill>
+      </a:fillStyleLst>
+      <a:lnStyleLst>
+        <a:ln w="6350" cap="flat" cmpd="sng" algn="ctr">
+          <a:solidFill>
+            <a:schemeClr val="phClr"/>
+          </a:solidFill>
+          <a:prstDash val="solid"/>
+          <a:miter lim="800000"/>
+        </a:ln>
+        <a:ln w="12700" cap="flat" cmpd="sng" algn="ctr">
+          <a:solidFill>
+            <a:schemeClr val="phClr"/>
+          </a:solidFill>
+          <a:prstDash val="solid"/>
+          <a:miter lim="800000"/>
+        </a:ln>
+        <a:ln w="19050" cap="flat" cmpd="sng" algn="ctr">
+          <a:solidFill>
+            <a:schemeClr val="phClr"/>
+          </a:solidFill>
+          <a:prstDash val="solid"/>
+          <a:miter lim="800000"/>
+        </a:ln>
+      </a:lnStyleLst>
+      <a:effectStyleLst>
+        <a:effectStyle>
+          <a:effectLst/>
+        </a:effectStyle>
+        <a:effectStyle>
+          <a:effectLst/>
+        </a:effectStyle>
+        <a:effectStyle>
+          <a:effectLst>
+            <a:outerShdw blurRad="57150" dist="19050" dir="5400000" algn="ctr" rotWithShape="0">
+              <a:srgbClr val="000000">
+                <a:alpha val="63000"/>
+              </a:srgbClr>
+            </a:outerShdw>
+          </a:effectLst>
+        </a:effectStyle>
+      </a:effectStyleLst>
+      <a:bgFillStyleLst>
+        <a:solidFill>
+          <a:schemeClr val="phClr"/>
+        </a:solidFill>
+        <a:solidFill>
+          <a:schemeClr val="phClr">
+            <a:tint val="95000"/>
+            <a:satMod val="170000"/>
+          </a:schemeClr>
+        </a:solidFill>
+        <a:gradFill rotWithShape="1">
+          <a:gsLst>
+            <a:gs pos="0">
+              <a:schemeClr val="phClr">
+                <a:tint val="93000"/>
+                <a:satMod val="150000"/>
+                <a:shade val="98000"/>
+                <a:lumMod val="102000"/>
+              </a:schemeClr>
+            </a:gs>
+            <a:gs pos="50000">
+              <a:schemeClr val="phClr">
+                <a:tint val="98000"/>
+                <a:satMod val="130000"/>
+                <a:shade val="90000"/>
+                <a:lumMod val="103000"/>
+              </a:schemeClr>
+            </a:gs>
+            <a:gs pos="100000">
+              <a:schemeClr val="phClr">
+                <a:shade val="63000"/>
+                <a:satMod val="120000"/>
+              </a:schemeClr>
+            </a:gs>
+          </a:gsLst>
+          <a:lin ang="5400000" scaled="0"/>
+        </a:gradFill>
+      </a:bgFillStyleLst>
+    </a:fmtScheme>
+  </a:themeElements>
+  <a:objectDefaults/>
+  <a:extraClrSchemeLst/>
+  <a:extLst>
+    <a:ext uri="{05A4C25C-085E-4340-85A3-A5531E510DB2}">
+      <thm15:themeFamily xmlns:thm15="http://schemas.microsoft.com/office/thememl/2012/main" name="Office Theme" id="{62F939B6-93AF-4DB8-9C6B-D6C7DFDC589F}" vid="{4A3C46E8-61CC-4603-A589-7422A47A8E4A}"/>
+    </a:ext>
+  </a:extLst>
+</a:theme>
 </file>
</xml_diff>